<commit_message>
Atualizando LLD para v1.3
Ajuste no layout do ppt, mudança de ícones de textos do diagrama.
</commit_message>
<xml_diff>
--- a/projeto/Documentos/LLD.pptx
+++ b/projeto/Documentos/LLD.pptx
@@ -3355,8 +3355,8 @@
         </p:blipFill>
         <p:spPr bwMode="auto">
           <a:xfrm>
-            <a:off x="4458931" y="416107"/>
-            <a:ext cx="917923" cy="917923"/>
+            <a:off x="4767779" y="535274"/>
+            <a:ext cx="787483" cy="787483"/>
           </a:xfrm>
           <a:prstGeom prst="rect">
             <a:avLst/>
@@ -3402,7 +3402,7 @@
         </p:blipFill>
         <p:spPr bwMode="auto">
           <a:xfrm>
-            <a:off x="5614372" y="866845"/>
+            <a:off x="5601043" y="977779"/>
             <a:ext cx="1193006" cy="344978"/>
           </a:xfrm>
           <a:prstGeom prst="rect">
@@ -3434,8 +3434,8 @@
         </p:nvSpPr>
         <p:spPr>
           <a:xfrm flipH="1">
-            <a:off x="1831428" y="5613029"/>
-            <a:ext cx="1104900" cy="342900"/>
+            <a:off x="1698454" y="5613029"/>
+            <a:ext cx="1390462" cy="306775"/>
           </a:xfrm>
           <a:prstGeom prst="leftArrow">
             <a:avLst/>
@@ -3480,8 +3480,8 @@
         </p:nvSpPr>
         <p:spPr>
           <a:xfrm>
-            <a:off x="16485" y="3429000"/>
-            <a:ext cx="5582940" cy="3428999"/>
+            <a:off x="16485" y="3542329"/>
+            <a:ext cx="5490181" cy="3315670"/>
           </a:xfrm>
           <a:prstGeom prst="flowChartProcess">
             <a:avLst/>
@@ -3534,8 +3534,8 @@
         </p:nvSpPr>
         <p:spPr>
           <a:xfrm>
-            <a:off x="6420532" y="3429000"/>
-            <a:ext cx="5663097" cy="3428999"/>
+            <a:off x="6453695" y="3542329"/>
+            <a:ext cx="5629934" cy="3315670"/>
           </a:xfrm>
           <a:prstGeom prst="flowChartProcess">
             <a:avLst/>
@@ -3603,7 +3603,7 @@
         </p:blipFill>
         <p:spPr bwMode="auto">
           <a:xfrm>
-            <a:off x="8989862" y="3458739"/>
+            <a:off x="10023197" y="3637920"/>
             <a:ext cx="1040716" cy="1040716"/>
           </a:xfrm>
           <a:prstGeom prst="rect">
@@ -3650,7 +3650,7 @@
         </p:blipFill>
         <p:spPr bwMode="auto">
           <a:xfrm>
-            <a:off x="1525871" y="3430044"/>
+            <a:off x="1502177" y="3637920"/>
             <a:ext cx="936058" cy="936058"/>
           </a:xfrm>
           <a:prstGeom prst="rect">
@@ -3697,7 +3697,7 @@
         </p:blipFill>
         <p:spPr bwMode="auto">
           <a:xfrm>
-            <a:off x="8165510" y="4916266"/>
+            <a:off x="8093525" y="4803024"/>
             <a:ext cx="1299305" cy="1299305"/>
           </a:xfrm>
           <a:prstGeom prst="rect">
@@ -3744,7 +3744,7 @@
         </p:blipFill>
         <p:spPr bwMode="auto">
           <a:xfrm>
-            <a:off x="9438278" y="2548188"/>
+            <a:off x="10192482" y="2884948"/>
             <a:ext cx="702146" cy="702146"/>
           </a:xfrm>
           <a:prstGeom prst="rect">
@@ -3791,7 +3791,7 @@
         </p:blipFill>
         <p:spPr bwMode="auto">
           <a:xfrm>
-            <a:off x="1603922" y="2687300"/>
+            <a:off x="1208083" y="2858723"/>
             <a:ext cx="779956" cy="733724"/>
           </a:xfrm>
           <a:prstGeom prst="rect">
@@ -3882,8 +3882,8 @@
         </p:blipFill>
         <p:spPr>
           <a:xfrm>
-            <a:off x="3952945" y="-1094105"/>
-            <a:ext cx="3712825" cy="3642293"/>
+            <a:off x="4367481" y="-774408"/>
+            <a:ext cx="3229100" cy="3167758"/>
           </a:xfrm>
           <a:prstGeom prst="rect">
             <a:avLst/>
@@ -3919,7 +3919,7 @@
         </p:blipFill>
         <p:spPr bwMode="auto">
           <a:xfrm>
-            <a:off x="8165510" y="6210196"/>
+            <a:off x="8450344" y="6157486"/>
             <a:ext cx="596999" cy="596999"/>
           </a:xfrm>
           <a:prstGeom prst="rect">
@@ -3966,7 +3966,7 @@
         </p:blipFill>
         <p:spPr bwMode="auto">
           <a:xfrm>
-            <a:off x="9046118" y="6186255"/>
+            <a:off x="9470919" y="6139275"/>
             <a:ext cx="660809" cy="633422"/>
           </a:xfrm>
           <a:prstGeom prst="rect">
@@ -4094,11 +4094,7 @@
             </a:r>
             <a:r>
               <a:rPr lang="pt-BR" dirty="0" smtClean="0"/>
-              <a:t>Uno </a:t>
-            </a:r>
-            <a:r>
-              <a:rPr lang="pt-BR" dirty="0" smtClean="0"/>
-              <a:t>ATmega328</a:t>
+              <a:t>Uno ATmega328</a:t>
             </a:r>
             <a:r>
               <a:rPr lang="pt-BR" dirty="0"/>
@@ -4130,7 +4126,7 @@
         </p:nvSpPr>
         <p:spPr>
           <a:xfrm>
-            <a:off x="6638092" y="4958833"/>
+            <a:off x="6802495" y="5057562"/>
             <a:ext cx="1299305" cy="646331"/>
           </a:xfrm>
           <a:prstGeom prst="rect">
@@ -4179,7 +4175,7 @@
         </p:nvSpPr>
         <p:spPr>
           <a:xfrm>
-            <a:off x="10157305" y="3996770"/>
+            <a:off x="9667384" y="4636892"/>
             <a:ext cx="1752343" cy="369332"/>
           </a:xfrm>
           <a:prstGeom prst="rect">
@@ -4214,7 +4210,7 @@
         </p:nvSpPr>
         <p:spPr>
           <a:xfrm>
-            <a:off x="9724019" y="5934670"/>
+            <a:off x="10381882" y="5919804"/>
             <a:ext cx="1626649" cy="923330"/>
           </a:xfrm>
           <a:prstGeom prst="rect">
@@ -4255,7 +4251,7 @@
         </p:nvSpPr>
         <p:spPr>
           <a:xfrm>
-            <a:off x="6571471" y="3819607"/>
+            <a:off x="6794049" y="3769610"/>
             <a:ext cx="1040716" cy="646331"/>
           </a:xfrm>
           <a:prstGeom prst="rect">
@@ -4305,7 +4301,7 @@
         </p:blipFill>
         <p:spPr bwMode="auto">
           <a:xfrm>
-            <a:off x="7238318" y="6210196"/>
+            <a:off x="7410790" y="6157486"/>
             <a:ext cx="613228" cy="596999"/>
           </a:xfrm>
           <a:prstGeom prst="rect">
@@ -4337,14 +4333,14 @@
         </p:nvSpPr>
         <p:spPr>
           <a:xfrm>
-            <a:off x="1993900" y="2204480"/>
-            <a:ext cx="3238379" cy="446193"/>
+            <a:off x="1537252" y="2378599"/>
+            <a:ext cx="4036924" cy="535026"/>
           </a:xfrm>
           <a:prstGeom prst="bentArrow">
             <a:avLst>
-              <a:gd name="adj1" fmla="val 25000"/>
-              <a:gd name="adj2" fmla="val 28827"/>
-              <a:gd name="adj3" fmla="val 50000"/>
+              <a:gd name="adj1" fmla="val 19717"/>
+              <a:gd name="adj2" fmla="val 28063"/>
+              <a:gd name="adj3" fmla="val 47215"/>
               <a:gd name="adj4" fmla="val 43750"/>
             </a:avLst>
           </a:prstGeom>
@@ -4407,8 +4403,8 @@
         </p:blipFill>
         <p:spPr bwMode="auto">
           <a:xfrm>
-            <a:off x="5445633" y="1962209"/>
-            <a:ext cx="779956" cy="779956"/>
+            <a:off x="5655489" y="2119009"/>
+            <a:ext cx="869543" cy="869543"/>
           </a:xfrm>
           <a:prstGeom prst="rect">
             <a:avLst/>
@@ -4439,7 +4435,7 @@
         </p:nvSpPr>
         <p:spPr>
           <a:xfrm>
-            <a:off x="5311048" y="2843767"/>
+            <a:off x="5615730" y="2947127"/>
             <a:ext cx="1109484" cy="369332"/>
           </a:xfrm>
           <a:prstGeom prst="rect">
@@ -4554,15 +4550,15 @@
         </p:nvSpPr>
         <p:spPr>
           <a:xfrm rot="5400000">
-            <a:off x="8007360" y="547179"/>
-            <a:ext cx="1591963" cy="2433450"/>
+            <a:off x="8154699" y="408268"/>
+            <a:ext cx="1880222" cy="3167335"/>
           </a:xfrm>
           <a:prstGeom prst="bentArrow">
             <a:avLst>
-              <a:gd name="adj1" fmla="val 7014"/>
-              <a:gd name="adj2" fmla="val 10167"/>
+              <a:gd name="adj1" fmla="val 5831"/>
+              <a:gd name="adj2" fmla="val 8645"/>
               <a:gd name="adj3" fmla="val 14943"/>
-              <a:gd name="adj4" fmla="val 43750"/>
+              <a:gd name="adj4" fmla="val 17517"/>
             </a:avLst>
           </a:prstGeom>
         </p:spPr>
@@ -4609,8 +4605,8 @@
         </p:nvSpPr>
         <p:spPr>
           <a:xfrm>
-            <a:off x="5705727" y="1540957"/>
-            <a:ext cx="320126" cy="421252"/>
+            <a:off x="5943600" y="1891209"/>
+            <a:ext cx="304800" cy="248044"/>
           </a:xfrm>
           <a:prstGeom prst="upArrow">
             <a:avLst/>
@@ -4702,6 +4698,42 @@
             <a:r>
               <a:rPr lang="pt-BR" dirty="0" smtClean="0"/>
               <a:t>LED DIM</a:t>
+            </a:r>
+            <a:endParaRPr lang="pt-BR" dirty="0"/>
+          </a:p>
+        </p:txBody>
+      </p:sp>
+      <p:sp>
+        <p:nvSpPr>
+          <p:cNvPr id="34" name="CaixaDeTexto 33">
+            <a:extLst>
+              <a:ext uri="{FF2B5EF4-FFF2-40B4-BE49-F238E27FC236}">
+                <a16:creationId xmlns:a16="http://schemas.microsoft.com/office/drawing/2014/main" id="{1371B407-FE40-44B5-B500-A4667E8030DB}"/>
+              </a:ext>
+            </a:extLst>
+          </p:cNvPr>
+          <p:cNvSpPr txBox="1"/>
+          <p:nvPr/>
+        </p:nvSpPr>
+        <p:spPr>
+          <a:xfrm>
+            <a:off x="5601043" y="1527068"/>
+            <a:ext cx="1790950" cy="369332"/>
+          </a:xfrm>
+          <a:prstGeom prst="rect">
+            <a:avLst/>
+          </a:prstGeom>
+          <a:noFill/>
+        </p:spPr>
+        <p:txBody>
+          <a:bodyPr wrap="square" rtlCol="0">
+            <a:spAutoFit/>
+          </a:bodyPr>
+          <a:lstStyle/>
+          <a:p>
+            <a:r>
+              <a:rPr lang="pt-BR" dirty="0" smtClean="0"/>
+              <a:t>Servidor</a:t>
             </a:r>
             <a:endParaRPr lang="pt-BR" dirty="0"/>
           </a:p>

</xml_diff>

<commit_message>
Atualizando LLD para v1.4
</commit_message>
<xml_diff>
--- a/projeto/Documentos/LLD.pptx
+++ b/projeto/Documentos/LLD.pptx
@@ -259,7 +259,7 @@
           <a:p>
             <a:fld id="{9124C99E-1E2C-46C7-9544-CFE55FE760E5}" type="datetimeFigureOut">
               <a:rPr lang="pt-BR" smtClean="0"/>
-              <a:t>06/04/2020</a:t>
+              <a:t>07/04/2020</a:t>
             </a:fld>
             <a:endParaRPr lang="pt-BR"/>
           </a:p>
@@ -457,7 +457,7 @@
           <a:p>
             <a:fld id="{9124C99E-1E2C-46C7-9544-CFE55FE760E5}" type="datetimeFigureOut">
               <a:rPr lang="pt-BR" smtClean="0"/>
-              <a:t>06/04/2020</a:t>
+              <a:t>07/04/2020</a:t>
             </a:fld>
             <a:endParaRPr lang="pt-BR"/>
           </a:p>
@@ -665,7 +665,7 @@
           <a:p>
             <a:fld id="{9124C99E-1E2C-46C7-9544-CFE55FE760E5}" type="datetimeFigureOut">
               <a:rPr lang="pt-BR" smtClean="0"/>
-              <a:t>06/04/2020</a:t>
+              <a:t>07/04/2020</a:t>
             </a:fld>
             <a:endParaRPr lang="pt-BR"/>
           </a:p>
@@ -863,7 +863,7 @@
           <a:p>
             <a:fld id="{9124C99E-1E2C-46C7-9544-CFE55FE760E5}" type="datetimeFigureOut">
               <a:rPr lang="pt-BR" smtClean="0"/>
-              <a:t>06/04/2020</a:t>
+              <a:t>07/04/2020</a:t>
             </a:fld>
             <a:endParaRPr lang="pt-BR"/>
           </a:p>
@@ -1138,7 +1138,7 @@
           <a:p>
             <a:fld id="{9124C99E-1E2C-46C7-9544-CFE55FE760E5}" type="datetimeFigureOut">
               <a:rPr lang="pt-BR" smtClean="0"/>
-              <a:t>06/04/2020</a:t>
+              <a:t>07/04/2020</a:t>
             </a:fld>
             <a:endParaRPr lang="pt-BR"/>
           </a:p>
@@ -1403,7 +1403,7 @@
           <a:p>
             <a:fld id="{9124C99E-1E2C-46C7-9544-CFE55FE760E5}" type="datetimeFigureOut">
               <a:rPr lang="pt-BR" smtClean="0"/>
-              <a:t>06/04/2020</a:t>
+              <a:t>07/04/2020</a:t>
             </a:fld>
             <a:endParaRPr lang="pt-BR"/>
           </a:p>
@@ -1815,7 +1815,7 @@
           <a:p>
             <a:fld id="{9124C99E-1E2C-46C7-9544-CFE55FE760E5}" type="datetimeFigureOut">
               <a:rPr lang="pt-BR" smtClean="0"/>
-              <a:t>06/04/2020</a:t>
+              <a:t>07/04/2020</a:t>
             </a:fld>
             <a:endParaRPr lang="pt-BR"/>
           </a:p>
@@ -1956,7 +1956,7 @@
           <a:p>
             <a:fld id="{9124C99E-1E2C-46C7-9544-CFE55FE760E5}" type="datetimeFigureOut">
               <a:rPr lang="pt-BR" smtClean="0"/>
-              <a:t>06/04/2020</a:t>
+              <a:t>07/04/2020</a:t>
             </a:fld>
             <a:endParaRPr lang="pt-BR"/>
           </a:p>
@@ -2069,7 +2069,7 @@
           <a:p>
             <a:fld id="{9124C99E-1E2C-46C7-9544-CFE55FE760E5}" type="datetimeFigureOut">
               <a:rPr lang="pt-BR" smtClean="0"/>
-              <a:t>06/04/2020</a:t>
+              <a:t>07/04/2020</a:t>
             </a:fld>
             <a:endParaRPr lang="pt-BR"/>
           </a:p>
@@ -2380,7 +2380,7 @@
           <a:p>
             <a:fld id="{9124C99E-1E2C-46C7-9544-CFE55FE760E5}" type="datetimeFigureOut">
               <a:rPr lang="pt-BR" smtClean="0"/>
-              <a:t>06/04/2020</a:t>
+              <a:t>07/04/2020</a:t>
             </a:fld>
             <a:endParaRPr lang="pt-BR"/>
           </a:p>
@@ -2668,7 +2668,7 @@
           <a:p>
             <a:fld id="{9124C99E-1E2C-46C7-9544-CFE55FE760E5}" type="datetimeFigureOut">
               <a:rPr lang="pt-BR" smtClean="0"/>
-              <a:t>06/04/2020</a:t>
+              <a:t>07/04/2020</a:t>
             </a:fld>
             <a:endParaRPr lang="pt-BR"/>
           </a:p>
@@ -2909,7 +2909,7 @@
           <a:p>
             <a:fld id="{9124C99E-1E2C-46C7-9544-CFE55FE760E5}" type="datetimeFigureOut">
               <a:rPr lang="pt-BR" smtClean="0"/>
-              <a:t>06/04/2020</a:t>
+              <a:t>07/04/2020</a:t>
             </a:fld>
             <a:endParaRPr lang="pt-BR"/>
           </a:p>
@@ -3422,10 +3422,10 @@
       </p:pic>
       <p:sp>
         <p:nvSpPr>
-          <p:cNvPr id="12" name="Seta: para a Esquerda 11">
-            <a:extLst>
-              <a:ext uri="{FF2B5EF4-FFF2-40B4-BE49-F238E27FC236}">
-                <a16:creationId xmlns:a16="http://schemas.microsoft.com/office/drawing/2014/main" id="{40053657-B1CB-4984-831A-0F6F8422D236}"/>
+          <p:cNvPr id="14" name="Fluxograma: Processo 13">
+            <a:extLst>
+              <a:ext uri="{FF2B5EF4-FFF2-40B4-BE49-F238E27FC236}">
+                <a16:creationId xmlns:a16="http://schemas.microsoft.com/office/drawing/2014/main" id="{4A3ED908-8DC2-4D10-B7BA-E9172A8B98C2}"/>
               </a:ext>
             </a:extLst>
           </p:cNvPr>
@@ -3433,55 +3433,9 @@
           <p:nvPr/>
         </p:nvSpPr>
         <p:spPr>
-          <a:xfrm flipH="1">
-            <a:off x="1698454" y="5613029"/>
-            <a:ext cx="1390462" cy="306775"/>
-          </a:xfrm>
-          <a:prstGeom prst="leftArrow">
-            <a:avLst/>
-          </a:prstGeom>
-        </p:spPr>
-        <p:style>
-          <a:lnRef idx="2">
-            <a:schemeClr val="accent1">
-              <a:shade val="50000"/>
-            </a:schemeClr>
-          </a:lnRef>
-          <a:fillRef idx="1">
-            <a:schemeClr val="accent1"/>
-          </a:fillRef>
-          <a:effectRef idx="0">
-            <a:schemeClr val="accent1"/>
-          </a:effectRef>
-          <a:fontRef idx="minor">
-            <a:schemeClr val="lt1"/>
-          </a:fontRef>
-        </p:style>
-        <p:txBody>
-          <a:bodyPr rtlCol="0" anchor="ctr"/>
-          <a:lstStyle/>
-          <a:p>
-            <a:pPr algn="ctr"/>
-            <a:endParaRPr lang="pt-BR"/>
-          </a:p>
-        </p:txBody>
-      </p:sp>
-      <p:sp>
-        <p:nvSpPr>
-          <p:cNvPr id="14" name="Fluxograma: Processo 13">
-            <a:extLst>
-              <a:ext uri="{FF2B5EF4-FFF2-40B4-BE49-F238E27FC236}">
-                <a16:creationId xmlns:a16="http://schemas.microsoft.com/office/drawing/2014/main" id="{4A3ED908-8DC2-4D10-B7BA-E9172A8B98C2}"/>
-              </a:ext>
-            </a:extLst>
-          </p:cNvPr>
-          <p:cNvSpPr/>
-          <p:nvPr/>
-        </p:nvSpPr>
-        <p:spPr>
           <a:xfrm>
             <a:off x="16485" y="3542329"/>
-            <a:ext cx="5490181" cy="3315670"/>
+            <a:ext cx="6116930" cy="3315670"/>
           </a:xfrm>
           <a:prstGeom prst="flowChartProcess">
             <a:avLst/>
@@ -3603,7 +3557,7 @@
         </p:blipFill>
         <p:spPr bwMode="auto">
           <a:xfrm>
-            <a:off x="10023197" y="3637920"/>
+            <a:off x="8288181" y="3495935"/>
             <a:ext cx="1040716" cy="1040716"/>
           </a:xfrm>
           <a:prstGeom prst="rect">
@@ -3650,7 +3604,7 @@
         </p:blipFill>
         <p:spPr bwMode="auto">
           <a:xfrm>
-            <a:off x="1502177" y="3637920"/>
+            <a:off x="2242571" y="3735536"/>
             <a:ext cx="936058" cy="936058"/>
           </a:xfrm>
           <a:prstGeom prst="rect">
@@ -3715,37 +3669,24 @@
           </a:extLst>
         </p:spPr>
       </p:pic>
-      <p:pic>
-        <p:nvPicPr>
-          <p:cNvPr id="1052" name="Picture 28" descr="sinal de wifi - ícones de interface grátis">
-            <a:extLst>
-              <a:ext uri="{FF2B5EF4-FFF2-40B4-BE49-F238E27FC236}">
-                <a16:creationId xmlns:a16="http://schemas.microsoft.com/office/drawing/2014/main" id="{89AFF500-83F0-41D6-B0D6-5CEC52F13496}"/>
-              </a:ext>
-            </a:extLst>
-          </p:cNvPr>
-          <p:cNvPicPr>
-            <a:picLocks noChangeAspect="1" noChangeArrowheads="1"/>
-          </p:cNvPicPr>
+      <p:sp>
+        <p:nvSpPr>
+          <p:cNvPr id="16" name="AutoShape 32">
+            <a:extLst>
+              <a:ext uri="{FF2B5EF4-FFF2-40B4-BE49-F238E27FC236}">
+                <a16:creationId xmlns:a16="http://schemas.microsoft.com/office/drawing/2014/main" id="{F1CE5AC3-EE08-4FEE-9937-8142155B0317}"/>
+              </a:ext>
+            </a:extLst>
+          </p:cNvPr>
+          <p:cNvSpPr>
+            <a:spLocks noChangeAspect="1" noChangeArrowheads="1"/>
+          </p:cNvSpPr>
           <p:nvPr/>
-        </p:nvPicPr>
-        <p:blipFill>
-          <a:blip r:embed="rId7" cstate="hqprint">
-            <a:extLst>
-              <a:ext uri="{28A0092B-C50C-407E-A947-70E740481C1C}">
-                <a14:useLocalDpi xmlns:a14="http://schemas.microsoft.com/office/drawing/2010/main" val="0"/>
-              </a:ext>
-            </a:extLst>
-          </a:blip>
-          <a:srcRect/>
-          <a:stretch>
-            <a:fillRect/>
-          </a:stretch>
-        </p:blipFill>
+        </p:nvSpPr>
         <p:spPr bwMode="auto">
           <a:xfrm>
-            <a:off x="10192482" y="2884948"/>
-            <a:ext cx="702146" cy="702146"/>
+            <a:off x="5943600" y="3276600"/>
+            <a:ext cx="304800" cy="304800"/>
           </a:xfrm>
           <a:prstGeom prst="rect">
             <a:avLst/>
@@ -3761,13 +3702,60 @@
             </a:ext>
           </a:extLst>
         </p:spPr>
+        <p:txBody>
+          <a:bodyPr vert="horz" wrap="square" lIns="91440" tIns="45720" rIns="91440" bIns="45720" numCol="1" anchor="t" anchorCtr="0" compatLnSpc="1">
+            <a:prstTxWarp prst="textNoShape">
+              <a:avLst/>
+            </a:prstTxWarp>
+          </a:bodyPr>
+          <a:lstStyle/>
+          <a:p>
+            <a:endParaRPr lang="pt-BR"/>
+          </a:p>
+        </p:txBody>
+      </p:sp>
+      <p:pic>
+        <p:nvPicPr>
+          <p:cNvPr id="21" name="Imagem 20" descr="Fundo preto com letras brancas&#10;&#10;Descrição gerada automaticamente">
+            <a:extLst>
+              <a:ext uri="{FF2B5EF4-FFF2-40B4-BE49-F238E27FC236}">
+                <a16:creationId xmlns:a16="http://schemas.microsoft.com/office/drawing/2014/main" id="{50C8FA6E-AE8D-468D-A6DC-D2DFB03FD35D}"/>
+              </a:ext>
+            </a:extLst>
+          </p:cNvPr>
+          <p:cNvPicPr>
+            <a:picLocks noChangeAspect="1"/>
+          </p:cNvPicPr>
+          <p:nvPr/>
+        </p:nvPicPr>
+        <p:blipFill>
+          <a:blip r:embed="rId7">
+            <a:extLst>
+              <a:ext uri="{28A0092B-C50C-407E-A947-70E740481C1C}">
+                <a14:useLocalDpi xmlns:a14="http://schemas.microsoft.com/office/drawing/2010/main" val="0"/>
+              </a:ext>
+            </a:extLst>
+          </a:blip>
+          <a:stretch>
+            <a:fillRect/>
+          </a:stretch>
+        </p:blipFill>
+        <p:spPr>
+          <a:xfrm>
+            <a:off x="4294957" y="-811503"/>
+            <a:ext cx="3466180" cy="3243951"/>
+          </a:xfrm>
+          <a:prstGeom prst="rect">
+            <a:avLst/>
+          </a:prstGeom>
+        </p:spPr>
       </p:pic>
       <p:pic>
         <p:nvPicPr>
-          <p:cNvPr id="1054" name="Picture 30" descr="sinal de wifi - ícones de interface grátis">
-            <a:extLst>
-              <a:ext uri="{FF2B5EF4-FFF2-40B4-BE49-F238E27FC236}">
-                <a16:creationId xmlns:a16="http://schemas.microsoft.com/office/drawing/2014/main" id="{25574461-D3FA-434E-BE9D-3141FD3D5131}"/>
+          <p:cNvPr id="1060" name="Picture 36" descr="Google Chrome Logotipo Navegador - Gráfico vetorial grátis no Pixabay">
+            <a:extLst>
+              <a:ext uri="{FF2B5EF4-FFF2-40B4-BE49-F238E27FC236}">
+                <a16:creationId xmlns:a16="http://schemas.microsoft.com/office/drawing/2014/main" id="{E653D5E2-C9D0-408E-96DB-135EDF601BDB}"/>
               </a:ext>
             </a:extLst>
           </p:cNvPr>
@@ -3777,7 +3765,7 @@
           <p:nvPr/>
         </p:nvPicPr>
         <p:blipFill>
-          <a:blip r:embed="rId7" cstate="hqprint">
+          <a:blip r:embed="rId8" cstate="hqprint">
             <a:extLst>
               <a:ext uri="{28A0092B-C50C-407E-A947-70E740481C1C}">
                 <a14:useLocalDpi xmlns:a14="http://schemas.microsoft.com/office/drawing/2010/main" val="0"/>
@@ -3791,8 +3779,8 @@
         </p:blipFill>
         <p:spPr bwMode="auto">
           <a:xfrm>
-            <a:off x="1208083" y="2858723"/>
-            <a:ext cx="779956" cy="733724"/>
+            <a:off x="8450344" y="6157486"/>
+            <a:ext cx="596999" cy="596999"/>
           </a:xfrm>
           <a:prstGeom prst="rect">
             <a:avLst/>
@@ -3809,24 +3797,37 @@
           </a:extLst>
         </p:spPr>
       </p:pic>
-      <p:sp>
-        <p:nvSpPr>
-          <p:cNvPr id="16" name="AutoShape 32">
-            <a:extLst>
-              <a:ext uri="{FF2B5EF4-FFF2-40B4-BE49-F238E27FC236}">
-                <a16:creationId xmlns:a16="http://schemas.microsoft.com/office/drawing/2014/main" id="{F1CE5AC3-EE08-4FEE-9937-8142155B0317}"/>
-              </a:ext>
-            </a:extLst>
-          </p:cNvPr>
-          <p:cNvSpPr>
-            <a:spLocks noChangeAspect="1" noChangeArrowheads="1"/>
-          </p:cNvSpPr>
+      <p:pic>
+        <p:nvPicPr>
+          <p:cNvPr id="1062" name="Picture 38" descr="Doce Sonho Alado :.: Mozilla Firefox">
+            <a:extLst>
+              <a:ext uri="{FF2B5EF4-FFF2-40B4-BE49-F238E27FC236}">
+                <a16:creationId xmlns:a16="http://schemas.microsoft.com/office/drawing/2014/main" id="{5FDB14D1-CE82-4C5A-90F9-10F5EC486793}"/>
+              </a:ext>
+            </a:extLst>
+          </p:cNvPr>
+          <p:cNvPicPr>
+            <a:picLocks noChangeAspect="1" noChangeArrowheads="1"/>
+          </p:cNvPicPr>
           <p:nvPr/>
-        </p:nvSpPr>
+        </p:nvPicPr>
+        <p:blipFill>
+          <a:blip r:embed="rId9" cstate="hqprint">
+            <a:extLst>
+              <a:ext uri="{28A0092B-C50C-407E-A947-70E740481C1C}">
+                <a14:useLocalDpi xmlns:a14="http://schemas.microsoft.com/office/drawing/2010/main" val="0"/>
+              </a:ext>
+            </a:extLst>
+          </a:blip>
+          <a:srcRect/>
+          <a:stretch>
+            <a:fillRect/>
+          </a:stretch>
+        </p:blipFill>
         <p:spPr bwMode="auto">
           <a:xfrm>
-            <a:off x="5943600" y="3276600"/>
-            <a:ext cx="304800" cy="304800"/>
+            <a:off x="9470919" y="6139275"/>
+            <a:ext cx="660809" cy="633422"/>
           </a:xfrm>
           <a:prstGeom prst="rect">
             <a:avLst/>
@@ -3842,60 +3843,268 @@
             </a:ext>
           </a:extLst>
         </p:spPr>
-        <p:txBody>
-          <a:bodyPr vert="horz" wrap="square" lIns="91440" tIns="45720" rIns="91440" bIns="45720" numCol="1" anchor="t" anchorCtr="0" compatLnSpc="1">
-            <a:prstTxWarp prst="textNoShape">
-              <a:avLst/>
-            </a:prstTxWarp>
-          </a:bodyPr>
-          <a:lstStyle/>
-          <a:p>
-            <a:endParaRPr lang="pt-BR"/>
-          </a:p>
-        </p:txBody>
-      </p:sp>
-      <p:pic>
-        <p:nvPicPr>
-          <p:cNvPr id="21" name="Imagem 20" descr="Fundo preto com letras brancas&#10;&#10;Descrição gerada automaticamente">
-            <a:extLst>
-              <a:ext uri="{FF2B5EF4-FFF2-40B4-BE49-F238E27FC236}">
-                <a16:creationId xmlns:a16="http://schemas.microsoft.com/office/drawing/2014/main" id="{50C8FA6E-AE8D-468D-A6DC-D2DFB03FD35D}"/>
-              </a:ext>
-            </a:extLst>
-          </p:cNvPr>
-          <p:cNvPicPr>
-            <a:picLocks noChangeAspect="1"/>
-          </p:cNvPicPr>
+      </p:pic>
+      <p:sp>
+        <p:nvSpPr>
+          <p:cNvPr id="22" name="CaixaDeTexto 21">
+            <a:extLst>
+              <a:ext uri="{FF2B5EF4-FFF2-40B4-BE49-F238E27FC236}">
+                <a16:creationId xmlns:a16="http://schemas.microsoft.com/office/drawing/2014/main" id="{1371B407-FE40-44B5-B500-A4667E8030DB}"/>
+              </a:ext>
+            </a:extLst>
+          </p:cNvPr>
+          <p:cNvSpPr txBox="1"/>
           <p:nvPr/>
-        </p:nvPicPr>
-        <p:blipFill>
-          <a:blip r:embed="rId8">
-            <a:extLst>
-              <a:ext uri="{28A0092B-C50C-407E-A947-70E740481C1C}">
-                <a14:useLocalDpi xmlns:a14="http://schemas.microsoft.com/office/drawing/2010/main" val="0"/>
-              </a:ext>
-            </a:extLst>
-          </a:blip>
-          <a:stretch>
-            <a:fillRect/>
-          </a:stretch>
-        </p:blipFill>
+        </p:nvSpPr>
         <p:spPr>
           <a:xfrm>
-            <a:off x="4367481" y="-774408"/>
-            <a:ext cx="3229100" cy="3167758"/>
+            <a:off x="171090" y="4288088"/>
+            <a:ext cx="1790950" cy="369332"/>
           </a:xfrm>
           <a:prstGeom prst="rect">
             <a:avLst/>
           </a:prstGeom>
-        </p:spPr>
-      </p:pic>
+          <a:noFill/>
+        </p:spPr>
+        <p:txBody>
+          <a:bodyPr wrap="square" rtlCol="0">
+            <a:spAutoFit/>
+          </a:bodyPr>
+          <a:lstStyle/>
+          <a:p>
+            <a:r>
+              <a:rPr lang="pt-BR" dirty="0"/>
+              <a:t>Roteador WiFi</a:t>
+            </a:r>
+          </a:p>
+        </p:txBody>
+      </p:sp>
+      <p:sp>
+        <p:nvSpPr>
+          <p:cNvPr id="23" name="CaixaDeTexto 22">
+            <a:extLst>
+              <a:ext uri="{FF2B5EF4-FFF2-40B4-BE49-F238E27FC236}">
+                <a16:creationId xmlns:a16="http://schemas.microsoft.com/office/drawing/2014/main" id="{7A50F01C-B5C0-44C5-841A-7817CE3A249C}"/>
+              </a:ext>
+            </a:extLst>
+          </p:cNvPr>
+          <p:cNvSpPr txBox="1"/>
+          <p:nvPr/>
+        </p:nvSpPr>
+        <p:spPr>
+          <a:xfrm>
+            <a:off x="1566039" y="4950731"/>
+            <a:ext cx="1294956" cy="646331"/>
+          </a:xfrm>
+          <a:prstGeom prst="rect">
+            <a:avLst/>
+          </a:prstGeom>
+          <a:noFill/>
+        </p:spPr>
+        <p:txBody>
+          <a:bodyPr wrap="square" rtlCol="0">
+            <a:spAutoFit/>
+          </a:bodyPr>
+          <a:lstStyle/>
+          <a:p>
+            <a:r>
+              <a:rPr lang="pt-BR" dirty="0"/>
+              <a:t>Leitura intensidade</a:t>
+            </a:r>
+          </a:p>
+        </p:txBody>
+      </p:sp>
+      <p:sp>
+        <p:nvSpPr>
+          <p:cNvPr id="24" name="CaixaDeTexto 23">
+            <a:extLst>
+              <a:ext uri="{FF2B5EF4-FFF2-40B4-BE49-F238E27FC236}">
+                <a16:creationId xmlns:a16="http://schemas.microsoft.com/office/drawing/2014/main" id="{CA542F15-CC0E-4B72-BFDD-00C8997D917A}"/>
+              </a:ext>
+            </a:extLst>
+          </p:cNvPr>
+          <p:cNvSpPr txBox="1"/>
+          <p:nvPr/>
+        </p:nvSpPr>
+        <p:spPr>
+          <a:xfrm>
+            <a:off x="2868431" y="6253372"/>
+            <a:ext cx="3075169" cy="646331"/>
+          </a:xfrm>
+          <a:prstGeom prst="rect">
+            <a:avLst/>
+          </a:prstGeom>
+          <a:noFill/>
+        </p:spPr>
+        <p:txBody>
+          <a:bodyPr wrap="square" rtlCol="0">
+            <a:spAutoFit/>
+          </a:bodyPr>
+          <a:lstStyle/>
+          <a:p>
+            <a:pPr algn="just"/>
+            <a:r>
+              <a:rPr lang="pt-BR" dirty="0"/>
+              <a:t>Arduino Uno ATmega328 +módulo ESP8266 integrado</a:t>
+            </a:r>
+          </a:p>
+        </p:txBody>
+      </p:sp>
+      <p:sp>
+        <p:nvSpPr>
+          <p:cNvPr id="25" name="CaixaDeTexto 24">
+            <a:extLst>
+              <a:ext uri="{FF2B5EF4-FFF2-40B4-BE49-F238E27FC236}">
+                <a16:creationId xmlns:a16="http://schemas.microsoft.com/office/drawing/2014/main" id="{BB1FBAB9-CAF1-45FD-843E-70B31324308A}"/>
+              </a:ext>
+            </a:extLst>
+          </p:cNvPr>
+          <p:cNvSpPr txBox="1"/>
+          <p:nvPr/>
+        </p:nvSpPr>
+        <p:spPr>
+          <a:xfrm>
+            <a:off x="6586831" y="4747867"/>
+            <a:ext cx="1514969" cy="923330"/>
+          </a:xfrm>
+          <a:prstGeom prst="rect">
+            <a:avLst/>
+          </a:prstGeom>
+          <a:noFill/>
+        </p:spPr>
+        <p:txBody>
+          <a:bodyPr wrap="square" rtlCol="0">
+            <a:spAutoFit/>
+          </a:bodyPr>
+          <a:lstStyle/>
+          <a:p>
+            <a:r>
+              <a:rPr lang="pt-BR" dirty="0"/>
+              <a:t>Desktop/Notebook</a:t>
+            </a:r>
+          </a:p>
+          <a:p>
+            <a:endParaRPr lang="pt-BR" dirty="0"/>
+          </a:p>
+        </p:txBody>
+      </p:sp>
+      <p:sp>
+        <p:nvSpPr>
+          <p:cNvPr id="26" name="CaixaDeTexto 25">
+            <a:extLst>
+              <a:ext uri="{FF2B5EF4-FFF2-40B4-BE49-F238E27FC236}">
+                <a16:creationId xmlns:a16="http://schemas.microsoft.com/office/drawing/2014/main" id="{F84570CB-BC78-4052-9E0F-1B060A8B3BF7}"/>
+              </a:ext>
+            </a:extLst>
+          </p:cNvPr>
+          <p:cNvSpPr txBox="1"/>
+          <p:nvPr/>
+        </p:nvSpPr>
+        <p:spPr>
+          <a:xfrm>
+            <a:off x="9349103" y="4144713"/>
+            <a:ext cx="1752343" cy="369332"/>
+          </a:xfrm>
+          <a:prstGeom prst="rect">
+            <a:avLst/>
+          </a:prstGeom>
+          <a:noFill/>
+        </p:spPr>
+        <p:txBody>
+          <a:bodyPr wrap="square" rtlCol="0">
+            <a:spAutoFit/>
+          </a:bodyPr>
+          <a:lstStyle/>
+          <a:p>
+            <a:r>
+              <a:rPr lang="pt-BR" dirty="0"/>
+              <a:t>Banda 5Mb min</a:t>
+            </a:r>
+          </a:p>
+        </p:txBody>
+      </p:sp>
+      <p:sp>
+        <p:nvSpPr>
+          <p:cNvPr id="27" name="CaixaDeTexto 26">
+            <a:extLst>
+              <a:ext uri="{FF2B5EF4-FFF2-40B4-BE49-F238E27FC236}">
+                <a16:creationId xmlns:a16="http://schemas.microsoft.com/office/drawing/2014/main" id="{9CCE1DF6-460D-462D-BE7B-FBE5E854B216}"/>
+              </a:ext>
+            </a:extLst>
+          </p:cNvPr>
+          <p:cNvSpPr txBox="1"/>
+          <p:nvPr/>
+        </p:nvSpPr>
+        <p:spPr>
+          <a:xfrm>
+            <a:off x="10381882" y="5919804"/>
+            <a:ext cx="1626649" cy="923330"/>
+          </a:xfrm>
+          <a:prstGeom prst="rect">
+            <a:avLst/>
+          </a:prstGeom>
+          <a:noFill/>
+        </p:spPr>
+        <p:txBody>
+          <a:bodyPr wrap="square" rtlCol="0">
+            <a:spAutoFit/>
+          </a:bodyPr>
+          <a:lstStyle/>
+          <a:p>
+            <a:r>
+              <a:rPr lang="pt-BR" dirty="0"/>
+              <a:t>Navegador onde site está</a:t>
+            </a:r>
+          </a:p>
+          <a:p>
+            <a:r>
+              <a:rPr lang="pt-BR" dirty="0"/>
+              <a:t>hospedado</a:t>
+            </a:r>
+          </a:p>
+        </p:txBody>
+      </p:sp>
+      <p:sp>
+        <p:nvSpPr>
+          <p:cNvPr id="29" name="CaixaDeTexto 28">
+            <a:extLst>
+              <a:ext uri="{FF2B5EF4-FFF2-40B4-BE49-F238E27FC236}">
+                <a16:creationId xmlns:a16="http://schemas.microsoft.com/office/drawing/2014/main" id="{86EDEA83-6B84-4CDF-A04C-88150ED12032}"/>
+              </a:ext>
+            </a:extLst>
+          </p:cNvPr>
+          <p:cNvSpPr txBox="1"/>
+          <p:nvPr/>
+        </p:nvSpPr>
+        <p:spPr>
+          <a:xfrm>
+            <a:off x="6794049" y="3769610"/>
+            <a:ext cx="1040716" cy="646331"/>
+          </a:xfrm>
+          <a:prstGeom prst="rect">
+            <a:avLst/>
+          </a:prstGeom>
+          <a:noFill/>
+        </p:spPr>
+        <p:txBody>
+          <a:bodyPr wrap="square" rtlCol="0">
+            <a:spAutoFit/>
+          </a:bodyPr>
+          <a:lstStyle/>
+          <a:p>
+            <a:r>
+              <a:rPr lang="pt-BR" dirty="0"/>
+              <a:t>Lan WiFi Network</a:t>
+            </a:r>
+          </a:p>
+        </p:txBody>
+      </p:sp>
       <p:pic>
         <p:nvPicPr>
-          <p:cNvPr id="1060" name="Picture 36" descr="Google Chrome Logotipo Navegador - Gráfico vetorial grátis no Pixabay">
-            <a:extLst>
-              <a:ext uri="{FF2B5EF4-FFF2-40B4-BE49-F238E27FC236}">
-                <a16:creationId xmlns:a16="http://schemas.microsoft.com/office/drawing/2014/main" id="{E653D5E2-C9D0-408E-96DB-135EDF601BDB}"/>
+          <p:cNvPr id="1066" name="Picture 42" descr="Free Web Icons, 1,000+ Icons in PNG, EPS, SVG format">
+            <a:extLst>
+              <a:ext uri="{FF2B5EF4-FFF2-40B4-BE49-F238E27FC236}">
+                <a16:creationId xmlns:a16="http://schemas.microsoft.com/office/drawing/2014/main" id="{8D92FA00-9723-4A00-BE09-C5959FEFB2E2}"/>
               </a:ext>
             </a:extLst>
           </p:cNvPr>
@@ -3905,7 +4114,7 @@
           <p:nvPr/>
         </p:nvPicPr>
         <p:blipFill>
-          <a:blip r:embed="rId9" cstate="hqprint">
+          <a:blip r:embed="rId10" cstate="hqprint">
             <a:extLst>
               <a:ext uri="{28A0092B-C50C-407E-A947-70E740481C1C}">
                 <a14:useLocalDpi xmlns:a14="http://schemas.microsoft.com/office/drawing/2010/main" val="0"/>
@@ -3919,8 +4128,8 @@
         </p:blipFill>
         <p:spPr bwMode="auto">
           <a:xfrm>
-            <a:off x="8450344" y="6157486"/>
-            <a:ext cx="596999" cy="596999"/>
+            <a:off x="5787609" y="2268217"/>
+            <a:ext cx="613228" cy="596999"/>
           </a:xfrm>
           <a:prstGeom prst="rect">
             <a:avLst/>
@@ -3937,12 +4146,82 @@
           </a:extLst>
         </p:spPr>
       </p:pic>
+      <p:sp>
+        <p:nvSpPr>
+          <p:cNvPr id="32" name="CaixaDeTexto 31">
+            <a:extLst>
+              <a:ext uri="{FF2B5EF4-FFF2-40B4-BE49-F238E27FC236}">
+                <a16:creationId xmlns:a16="http://schemas.microsoft.com/office/drawing/2014/main" id="{6F157145-322C-4101-B95E-8B9FEDFC2BF6}"/>
+              </a:ext>
+            </a:extLst>
+          </p:cNvPr>
+          <p:cNvSpPr txBox="1"/>
+          <p:nvPr/>
+        </p:nvSpPr>
+        <p:spPr>
+          <a:xfrm>
+            <a:off x="5596104" y="2935095"/>
+            <a:ext cx="1109484" cy="369332"/>
+          </a:xfrm>
+          <a:prstGeom prst="rect">
+            <a:avLst/>
+          </a:prstGeom>
+          <a:noFill/>
+        </p:spPr>
+        <p:txBody>
+          <a:bodyPr wrap="square" rtlCol="0">
+            <a:spAutoFit/>
+          </a:bodyPr>
+          <a:lstStyle/>
+          <a:p>
+            <a:r>
+              <a:rPr lang="pt-BR" dirty="0"/>
+              <a:t>Internet</a:t>
+            </a:r>
+          </a:p>
+        </p:txBody>
+      </p:sp>
+      <p:sp>
+        <p:nvSpPr>
+          <p:cNvPr id="33" name="CaixaDeTexto 32">
+            <a:extLst>
+              <a:ext uri="{FF2B5EF4-FFF2-40B4-BE49-F238E27FC236}">
+                <a16:creationId xmlns:a16="http://schemas.microsoft.com/office/drawing/2014/main" id="{A56C689D-CDE0-4E65-9411-3D3156A067A8}"/>
+              </a:ext>
+            </a:extLst>
+          </p:cNvPr>
+          <p:cNvSpPr txBox="1"/>
+          <p:nvPr/>
+        </p:nvSpPr>
+        <p:spPr>
+          <a:xfrm>
+            <a:off x="5205281" y="5200164"/>
+            <a:ext cx="992265" cy="654235"/>
+          </a:xfrm>
+          <a:prstGeom prst="rect">
+            <a:avLst/>
+          </a:prstGeom>
+          <a:noFill/>
+        </p:spPr>
+        <p:txBody>
+          <a:bodyPr wrap="square" rtlCol="0">
+            <a:spAutoFit/>
+          </a:bodyPr>
+          <a:lstStyle/>
+          <a:p>
+            <a:r>
+              <a:rPr lang="pt-BR" dirty="0"/>
+              <a:t>Sensor LDR</a:t>
+            </a:r>
+          </a:p>
+        </p:txBody>
+      </p:sp>
       <p:pic>
         <p:nvPicPr>
-          <p:cNvPr id="1062" name="Picture 38" descr="Doce Sonho Alado :.: Mozilla Firefox">
-            <a:extLst>
-              <a:ext uri="{FF2B5EF4-FFF2-40B4-BE49-F238E27FC236}">
-                <a16:creationId xmlns:a16="http://schemas.microsoft.com/office/drawing/2014/main" id="{5FDB14D1-CE82-4C5A-90F9-10F5EC486793}"/>
+          <p:cNvPr id="1072" name="Picture 48" descr="ldr con led | Tinkercad">
+            <a:extLst>
+              <a:ext uri="{FF2B5EF4-FFF2-40B4-BE49-F238E27FC236}">
+                <a16:creationId xmlns:a16="http://schemas.microsoft.com/office/drawing/2014/main" id="{3F72D2D4-0860-4294-8715-8199A75F617F}"/>
               </a:ext>
             </a:extLst>
           </p:cNvPr>
@@ -3951,23 +4230,21 @@
           </p:cNvPicPr>
           <p:nvPr/>
         </p:nvPicPr>
-        <p:blipFill>
-          <a:blip r:embed="rId10" cstate="hqprint">
+        <p:blipFill rotWithShape="1">
+          <a:blip r:embed="rId11">
             <a:extLst>
               <a:ext uri="{28A0092B-C50C-407E-A947-70E740481C1C}">
                 <a14:useLocalDpi xmlns:a14="http://schemas.microsoft.com/office/drawing/2010/main" val="0"/>
               </a:ext>
             </a:extLst>
           </a:blip>
-          <a:srcRect/>
-          <a:stretch>
-            <a:fillRect/>
-          </a:stretch>
+          <a:srcRect l="24505"/>
+          <a:stretch/>
         </p:blipFill>
         <p:spPr bwMode="auto">
           <a:xfrm>
-            <a:off x="9470919" y="6139275"/>
-            <a:ext cx="660809" cy="633422"/>
+            <a:off x="3304299" y="4463406"/>
+            <a:ext cx="1991502" cy="2443147"/>
           </a:xfrm>
           <a:prstGeom prst="rect">
             <a:avLst/>
@@ -3984,12 +4261,42 @@
           </a:extLst>
         </p:spPr>
       </p:pic>
-      <p:sp>
-        <p:nvSpPr>
-          <p:cNvPr id="22" name="CaixaDeTexto 21">
-            <a:extLst>
-              <a:ext uri="{FF2B5EF4-FFF2-40B4-BE49-F238E27FC236}">
-                <a16:creationId xmlns:a16="http://schemas.microsoft.com/office/drawing/2014/main" id="{1371B407-FE40-44B5-B500-A4667E8030DB}"/>
+      <p:pic>
+        <p:nvPicPr>
+          <p:cNvPr id="3" name="Imagem 2" descr="Original file ‎ (SVG file, nominally 100 × 100 pixels ..."/>
+          <p:cNvPicPr>
+            <a:picLocks noChangeAspect="1"/>
+          </p:cNvPicPr>
+          <p:nvPr/>
+        </p:nvPicPr>
+        <p:blipFill>
+          <a:blip r:embed="rId12" cstate="hqprint">
+            <a:extLst>
+              <a:ext uri="{28A0092B-C50C-407E-A947-70E740481C1C}">
+                <a14:useLocalDpi xmlns:a14="http://schemas.microsoft.com/office/drawing/2010/main" val="0"/>
+              </a:ext>
+            </a:extLst>
+          </a:blip>
+          <a:stretch>
+            <a:fillRect/>
+          </a:stretch>
+        </p:blipFill>
+        <p:spPr>
+          <a:xfrm>
+            <a:off x="-130546" y="5005172"/>
+            <a:ext cx="1359616" cy="1359616"/>
+          </a:xfrm>
+          <a:prstGeom prst="rect">
+            <a:avLst/>
+          </a:prstGeom>
+        </p:spPr>
+      </p:pic>
+      <p:sp>
+        <p:nvSpPr>
+          <p:cNvPr id="37" name="CaixaDeTexto 36">
+            <a:extLst>
+              <a:ext uri="{FF2B5EF4-FFF2-40B4-BE49-F238E27FC236}">
+                <a16:creationId xmlns:a16="http://schemas.microsoft.com/office/drawing/2014/main" id="{7A50F01C-B5C0-44C5-841A-7817CE3A249C}"/>
               </a:ext>
             </a:extLst>
           </p:cNvPr>
@@ -3998,8 +4305,8 @@
         </p:nvSpPr>
         <p:spPr>
           <a:xfrm>
-            <a:off x="2576531" y="3772388"/>
-            <a:ext cx="1790950" cy="369332"/>
+            <a:off x="295780" y="6313184"/>
+            <a:ext cx="999874" cy="369332"/>
           </a:xfrm>
           <a:prstGeom prst="rect">
             <a:avLst/>
@@ -4014,17 +4321,17 @@
           <a:p>
             <a:r>
               <a:rPr lang="pt-BR" dirty="0"/>
-              <a:t>Roteador WiFi</a:t>
-            </a:r>
-          </a:p>
-        </p:txBody>
-      </p:sp>
-      <p:sp>
-        <p:nvSpPr>
-          <p:cNvPr id="23" name="CaixaDeTexto 22">
-            <a:extLst>
-              <a:ext uri="{FF2B5EF4-FFF2-40B4-BE49-F238E27FC236}">
-                <a16:creationId xmlns:a16="http://schemas.microsoft.com/office/drawing/2014/main" id="{7A50F01C-B5C0-44C5-841A-7817CE3A249C}"/>
+              <a:t>LED DIM</a:t>
+            </a:r>
+          </a:p>
+        </p:txBody>
+      </p:sp>
+      <p:sp>
+        <p:nvSpPr>
+          <p:cNvPr id="34" name="CaixaDeTexto 33">
+            <a:extLst>
+              <a:ext uri="{FF2B5EF4-FFF2-40B4-BE49-F238E27FC236}">
+                <a16:creationId xmlns:a16="http://schemas.microsoft.com/office/drawing/2014/main" id="{1371B407-FE40-44B5-B500-A4667E8030DB}"/>
               </a:ext>
             </a:extLst>
           </p:cNvPr>
@@ -4033,8 +4340,8 @@
         </p:nvSpPr>
         <p:spPr>
           <a:xfrm>
-            <a:off x="1358724" y="5320413"/>
-            <a:ext cx="2050308" cy="369332"/>
+            <a:off x="5674565" y="540003"/>
+            <a:ext cx="1790950" cy="369332"/>
           </a:xfrm>
           <a:prstGeom prst="rect">
             <a:avLst/>
@@ -4048,236 +4355,266 @@
           <a:lstStyle/>
           <a:p>
             <a:r>
-              <a:rPr lang="pt-BR" dirty="0" smtClean="0"/>
-              <a:t>Leitura intensidade</a:t>
-            </a:r>
-            <a:endParaRPr lang="pt-BR" dirty="0"/>
-          </a:p>
-        </p:txBody>
-      </p:sp>
-      <p:sp>
-        <p:nvSpPr>
-          <p:cNvPr id="24" name="CaixaDeTexto 23">
-            <a:extLst>
-              <a:ext uri="{FF2B5EF4-FFF2-40B4-BE49-F238E27FC236}">
-                <a16:creationId xmlns:a16="http://schemas.microsoft.com/office/drawing/2014/main" id="{CA542F15-CC0E-4B72-BFDD-00C8997D917A}"/>
-              </a:ext>
-            </a:extLst>
-          </p:cNvPr>
-          <p:cNvSpPr txBox="1"/>
+              <a:rPr lang="pt-BR" dirty="0"/>
+              <a:t>Servidor</a:t>
+            </a:r>
+          </a:p>
+        </p:txBody>
+      </p:sp>
+      <p:cxnSp>
+        <p:nvCxnSpPr>
+          <p:cNvPr id="11" name="Conector de Seta Reta 10">
+            <a:extLst>
+              <a:ext uri="{FF2B5EF4-FFF2-40B4-BE49-F238E27FC236}">
+                <a16:creationId xmlns:a16="http://schemas.microsoft.com/office/drawing/2014/main" id="{A5CE53E4-6913-412C-A5BD-75EC8CD03145}"/>
+              </a:ext>
+            </a:extLst>
+          </p:cNvPr>
+          <p:cNvCxnSpPr>
+            <a:cxnSpLocks/>
+          </p:cNvCxnSpPr>
           <p:nvPr/>
-        </p:nvSpPr>
+        </p:nvCxnSpPr>
         <p:spPr>
           <a:xfrm>
-            <a:off x="2525874" y="6243575"/>
-            <a:ext cx="3075169" cy="646331"/>
-          </a:xfrm>
-          <a:prstGeom prst="rect">
+            <a:off x="1066565" y="2339661"/>
+            <a:ext cx="4529539" cy="92787"/>
+          </a:xfrm>
+          <a:prstGeom prst="straightConnector1">
             <a:avLst/>
           </a:prstGeom>
-          <a:noFill/>
-        </p:spPr>
-        <p:txBody>
-          <a:bodyPr wrap="square" rtlCol="0">
-            <a:spAutoFit/>
-          </a:bodyPr>
-          <a:lstStyle/>
-          <a:p>
-            <a:pPr algn="just"/>
-            <a:r>
-              <a:rPr lang="pt-BR" dirty="0" err="1"/>
-              <a:t>Arduino</a:t>
-            </a:r>
-            <a:r>
-              <a:rPr lang="pt-BR" dirty="0"/>
-              <a:t> </a:t>
-            </a:r>
-            <a:r>
-              <a:rPr lang="pt-BR" dirty="0" smtClean="0"/>
-              <a:t>Uno ATmega328</a:t>
-            </a:r>
-            <a:r>
-              <a:rPr lang="pt-BR" dirty="0"/>
-              <a:t> </a:t>
-            </a:r>
-            <a:r>
-              <a:rPr lang="pt-BR" dirty="0" smtClean="0"/>
-              <a:t>+</a:t>
-            </a:r>
-            <a:r>
-              <a:rPr lang="pt-BR" dirty="0"/>
-              <a:t>módulo ESP8266 integrado</a:t>
-            </a:r>
-            <a:endParaRPr lang="pt-BR" dirty="0" smtClean="0"/>
-          </a:p>
-        </p:txBody>
-      </p:sp>
-      <p:sp>
-        <p:nvSpPr>
-          <p:cNvPr id="25" name="CaixaDeTexto 24">
-            <a:extLst>
-              <a:ext uri="{FF2B5EF4-FFF2-40B4-BE49-F238E27FC236}">
-                <a16:creationId xmlns:a16="http://schemas.microsoft.com/office/drawing/2014/main" id="{BB1FBAB9-CAF1-45FD-843E-70B31324308A}"/>
-              </a:ext>
-            </a:extLst>
-          </p:cNvPr>
-          <p:cNvSpPr txBox="1"/>
+          <a:ln w="49530" cap="flat" cmpd="sng" algn="ctr">
+            <a:solidFill>
+              <a:schemeClr val="bg2">
+                <a:lumMod val="25000"/>
+              </a:schemeClr>
+            </a:solidFill>
+            <a:prstDash val="sysDash"/>
+            <a:round/>
+            <a:headEnd type="arrow" w="med" len="med"/>
+            <a:tailEnd type="arrow" w="med" len="med"/>
+          </a:ln>
+        </p:spPr>
+        <p:style>
+          <a:lnRef idx="0">
+            <a:scrgbClr r="0" g="0" b="0"/>
+          </a:lnRef>
+          <a:fillRef idx="0">
+            <a:scrgbClr r="0" g="0" b="0"/>
+          </a:fillRef>
+          <a:effectRef idx="0">
+            <a:scrgbClr r="0" g="0" b="0"/>
+          </a:effectRef>
+          <a:fontRef idx="minor">
+            <a:schemeClr val="tx1"/>
+          </a:fontRef>
+        </p:style>
+      </p:cxnSp>
+      <p:cxnSp>
+        <p:nvCxnSpPr>
+          <p:cNvPr id="49" name="Conector de Seta Reta 48">
+            <a:extLst>
+              <a:ext uri="{FF2B5EF4-FFF2-40B4-BE49-F238E27FC236}">
+                <a16:creationId xmlns:a16="http://schemas.microsoft.com/office/drawing/2014/main" id="{FA7B04D9-CE63-407F-8B14-D60F160AF564}"/>
+              </a:ext>
+            </a:extLst>
+          </p:cNvPr>
+          <p:cNvCxnSpPr>
+            <a:cxnSpLocks/>
+          </p:cNvCxnSpPr>
           <p:nvPr/>
-        </p:nvSpPr>
+        </p:nvCxnSpPr>
         <p:spPr>
-          <a:xfrm>
-            <a:off x="6802495" y="5057562"/>
-            <a:ext cx="1299305" cy="646331"/>
-          </a:xfrm>
-          <a:prstGeom prst="rect">
+          <a:xfrm flipV="1">
+            <a:off x="6662141" y="2353366"/>
+            <a:ext cx="4038768" cy="32688"/>
+          </a:xfrm>
+          <a:prstGeom prst="straightConnector1">
             <a:avLst/>
           </a:prstGeom>
-          <a:noFill/>
-        </p:spPr>
-        <p:txBody>
-          <a:bodyPr wrap="square" rtlCol="0">
-            <a:spAutoFit/>
-          </a:bodyPr>
-          <a:lstStyle/>
-          <a:p>
-            <a:r>
-              <a:rPr lang="pt-BR" dirty="0"/>
-              <a:t>Notebook</a:t>
-            </a:r>
-          </a:p>
-          <a:p>
-            <a:r>
-              <a:rPr lang="pt-BR" dirty="0"/>
-              <a:t>I5 4gb </a:t>
-            </a:r>
-            <a:r>
-              <a:rPr lang="pt-BR" dirty="0" err="1"/>
-              <a:t>Ram</a:t>
-            </a:r>
-            <a:r>
-              <a:rPr lang="pt-BR" dirty="0"/>
-              <a:t> </a:t>
-            </a:r>
-          </a:p>
-        </p:txBody>
-      </p:sp>
-      <p:sp>
-        <p:nvSpPr>
-          <p:cNvPr id="26" name="CaixaDeTexto 25">
-            <a:extLst>
-              <a:ext uri="{FF2B5EF4-FFF2-40B4-BE49-F238E27FC236}">
-                <a16:creationId xmlns:a16="http://schemas.microsoft.com/office/drawing/2014/main" id="{F84570CB-BC78-4052-9E0F-1B060A8B3BF7}"/>
-              </a:ext>
-            </a:extLst>
-          </p:cNvPr>
-          <p:cNvSpPr txBox="1"/>
+          <a:ln w="49530" cap="flat" cmpd="sng" algn="ctr">
+            <a:solidFill>
+              <a:schemeClr val="bg2">
+                <a:lumMod val="25000"/>
+              </a:schemeClr>
+            </a:solidFill>
+            <a:prstDash val="sysDash"/>
+            <a:round/>
+            <a:headEnd type="arrow" w="med" len="med"/>
+            <a:tailEnd type="arrow" w="med" len="med"/>
+          </a:ln>
+        </p:spPr>
+        <p:style>
+          <a:lnRef idx="0">
+            <a:scrgbClr r="0" g="0" b="0"/>
+          </a:lnRef>
+          <a:fillRef idx="0">
+            <a:scrgbClr r="0" g="0" b="0"/>
+          </a:fillRef>
+          <a:effectRef idx="0">
+            <a:scrgbClr r="0" g="0" b="0"/>
+          </a:effectRef>
+          <a:fontRef idx="minor">
+            <a:schemeClr val="tx1"/>
+          </a:fontRef>
+        </p:style>
+      </p:cxnSp>
+      <p:cxnSp>
+        <p:nvCxnSpPr>
+          <p:cNvPr id="52" name="Conector de Seta Reta 51">
+            <a:extLst>
+              <a:ext uri="{FF2B5EF4-FFF2-40B4-BE49-F238E27FC236}">
+                <a16:creationId xmlns:a16="http://schemas.microsoft.com/office/drawing/2014/main" id="{1151E090-A76A-48AD-9173-3F8E7FF37AC5}"/>
+              </a:ext>
+            </a:extLst>
+          </p:cNvPr>
+          <p:cNvCxnSpPr>
+            <a:cxnSpLocks/>
+          </p:cNvCxnSpPr>
           <p:nvPr/>
-        </p:nvSpPr>
+        </p:nvCxnSpPr>
         <p:spPr>
           <a:xfrm>
-            <a:off x="9667384" y="4636892"/>
-            <a:ext cx="1752343" cy="369332"/>
-          </a:xfrm>
-          <a:prstGeom prst="rect">
+            <a:off x="6094223" y="1613321"/>
+            <a:ext cx="1" cy="542563"/>
+          </a:xfrm>
+          <a:prstGeom prst="straightConnector1">
             <a:avLst/>
           </a:prstGeom>
-          <a:noFill/>
-        </p:spPr>
-        <p:txBody>
-          <a:bodyPr wrap="square" rtlCol="0">
-            <a:spAutoFit/>
-          </a:bodyPr>
-          <a:lstStyle/>
-          <a:p>
-            <a:r>
-              <a:rPr lang="pt-BR" dirty="0"/>
-              <a:t>Banda 5Mb min</a:t>
-            </a:r>
-          </a:p>
-        </p:txBody>
-      </p:sp>
-      <p:sp>
-        <p:nvSpPr>
-          <p:cNvPr id="27" name="CaixaDeTexto 26">
-            <a:extLst>
-              <a:ext uri="{FF2B5EF4-FFF2-40B4-BE49-F238E27FC236}">
-                <a16:creationId xmlns:a16="http://schemas.microsoft.com/office/drawing/2014/main" id="{9CCE1DF6-460D-462D-BE7B-FBE5E854B216}"/>
-              </a:ext>
-            </a:extLst>
-          </p:cNvPr>
-          <p:cNvSpPr txBox="1"/>
+          <a:ln w="49530" cap="flat" cmpd="sng" algn="ctr">
+            <a:solidFill>
+              <a:schemeClr val="bg2">
+                <a:lumMod val="25000"/>
+              </a:schemeClr>
+            </a:solidFill>
+            <a:prstDash val="sysDash"/>
+            <a:round/>
+            <a:headEnd type="arrow" w="med" len="med"/>
+            <a:tailEnd type="arrow" w="med" len="med"/>
+          </a:ln>
+        </p:spPr>
+        <p:style>
+          <a:lnRef idx="0">
+            <a:scrgbClr r="0" g="0" b="0"/>
+          </a:lnRef>
+          <a:fillRef idx="0">
+            <a:scrgbClr r="0" g="0" b="0"/>
+          </a:fillRef>
+          <a:effectRef idx="0">
+            <a:scrgbClr r="0" g="0" b="0"/>
+          </a:effectRef>
+          <a:fontRef idx="minor">
+            <a:schemeClr val="tx1"/>
+          </a:fontRef>
+        </p:style>
+      </p:cxnSp>
+      <p:cxnSp>
+        <p:nvCxnSpPr>
+          <p:cNvPr id="66" name="Conector de Seta Reta 65">
+            <a:extLst>
+              <a:ext uri="{FF2B5EF4-FFF2-40B4-BE49-F238E27FC236}">
+                <a16:creationId xmlns:a16="http://schemas.microsoft.com/office/drawing/2014/main" id="{2378A75E-5EA4-4230-9FAE-6B9DA3821BE4}"/>
+              </a:ext>
+            </a:extLst>
+          </p:cNvPr>
+          <p:cNvCxnSpPr>
+            <a:cxnSpLocks/>
+            <a:stCxn id="1048" idx="1"/>
+            <a:endCxn id="68" idx="2"/>
+          </p:cNvCxnSpPr>
           <p:nvPr/>
-        </p:nvSpPr>
+        </p:nvCxnSpPr>
         <p:spPr>
-          <a:xfrm>
-            <a:off x="10381882" y="5919804"/>
-            <a:ext cx="1626649" cy="923330"/>
-          </a:xfrm>
-          <a:prstGeom prst="rect">
+          <a:xfrm flipH="1" flipV="1">
+            <a:off x="633563" y="3456509"/>
+            <a:ext cx="1609008" cy="747056"/>
+          </a:xfrm>
+          <a:prstGeom prst="straightConnector1">
             <a:avLst/>
           </a:prstGeom>
-          <a:noFill/>
-        </p:spPr>
-        <p:txBody>
-          <a:bodyPr wrap="square" rtlCol="0">
-            <a:spAutoFit/>
-          </a:bodyPr>
-          <a:lstStyle/>
-          <a:p>
-            <a:r>
-              <a:rPr lang="pt-BR" dirty="0"/>
-              <a:t>Navegador onde site está</a:t>
-            </a:r>
-          </a:p>
-          <a:p>
-            <a:r>
-              <a:rPr lang="pt-BR" dirty="0"/>
-              <a:t>hospedado</a:t>
-            </a:r>
-          </a:p>
-        </p:txBody>
-      </p:sp>
-      <p:sp>
-        <p:nvSpPr>
-          <p:cNvPr id="29" name="CaixaDeTexto 28">
-            <a:extLst>
-              <a:ext uri="{FF2B5EF4-FFF2-40B4-BE49-F238E27FC236}">
-                <a16:creationId xmlns:a16="http://schemas.microsoft.com/office/drawing/2014/main" id="{86EDEA83-6B84-4CDF-A04C-88150ED12032}"/>
-              </a:ext>
-            </a:extLst>
-          </p:cNvPr>
-          <p:cNvSpPr txBox="1"/>
+          <a:ln w="49530" cap="flat" cmpd="sng" algn="ctr">
+            <a:solidFill>
+              <a:schemeClr val="bg2">
+                <a:lumMod val="25000"/>
+              </a:schemeClr>
+            </a:solidFill>
+            <a:prstDash val="sysDash"/>
+            <a:round/>
+            <a:headEnd type="arrow" w="med" len="med"/>
+            <a:tailEnd type="arrow" w="med" len="med"/>
+          </a:ln>
+        </p:spPr>
+        <p:style>
+          <a:lnRef idx="0">
+            <a:scrgbClr r="0" g="0" b="0"/>
+          </a:lnRef>
+          <a:fillRef idx="0">
+            <a:scrgbClr r="0" g="0" b="0"/>
+          </a:fillRef>
+          <a:effectRef idx="0">
+            <a:scrgbClr r="0" g="0" b="0"/>
+          </a:effectRef>
+          <a:fontRef idx="minor">
+            <a:schemeClr val="tx1"/>
+          </a:fontRef>
+        </p:style>
+      </p:cxnSp>
+      <p:cxnSp>
+        <p:nvCxnSpPr>
+          <p:cNvPr id="74" name="Conector de Seta Reta 73">
+            <a:extLst>
+              <a:ext uri="{FF2B5EF4-FFF2-40B4-BE49-F238E27FC236}">
+                <a16:creationId xmlns:a16="http://schemas.microsoft.com/office/drawing/2014/main" id="{B6A5F338-DD99-4E3B-9CCF-F53F2D10EA5D}"/>
+              </a:ext>
+            </a:extLst>
+          </p:cNvPr>
+          <p:cNvCxnSpPr>
+            <a:cxnSpLocks/>
+            <a:endCxn id="1046" idx="3"/>
+          </p:cNvCxnSpPr>
           <p:nvPr/>
-        </p:nvSpPr>
+        </p:nvCxnSpPr>
         <p:spPr>
-          <a:xfrm>
-            <a:off x="6794049" y="3769610"/>
-            <a:ext cx="1040716" cy="646331"/>
-          </a:xfrm>
-          <a:prstGeom prst="rect">
+          <a:xfrm flipH="1">
+            <a:off x="9328897" y="3542329"/>
+            <a:ext cx="1792756" cy="473964"/>
+          </a:xfrm>
+          <a:prstGeom prst="straightConnector1">
             <a:avLst/>
           </a:prstGeom>
-          <a:noFill/>
-        </p:spPr>
-        <p:txBody>
-          <a:bodyPr wrap="square" rtlCol="0">
-            <a:spAutoFit/>
-          </a:bodyPr>
-          <a:lstStyle/>
-          <a:p>
-            <a:r>
-              <a:rPr lang="pt-BR" dirty="0"/>
-              <a:t>Lan WiFi Network</a:t>
-            </a:r>
-          </a:p>
-        </p:txBody>
-      </p:sp>
+          <a:ln w="49530" cap="flat" cmpd="sng" algn="ctr">
+            <a:solidFill>
+              <a:schemeClr val="bg2">
+                <a:lumMod val="25000"/>
+              </a:schemeClr>
+            </a:solidFill>
+            <a:prstDash val="sysDash"/>
+            <a:round/>
+            <a:headEnd type="arrow" w="med" len="med"/>
+            <a:tailEnd type="arrow" w="med" len="med"/>
+          </a:ln>
+        </p:spPr>
+        <p:style>
+          <a:lnRef idx="0">
+            <a:scrgbClr r="0" g="0" b="0"/>
+          </a:lnRef>
+          <a:fillRef idx="0">
+            <a:scrgbClr r="0" g="0" b="0"/>
+          </a:fillRef>
+          <a:effectRef idx="0">
+            <a:scrgbClr r="0" g="0" b="0"/>
+          </a:effectRef>
+          <a:fontRef idx="minor">
+            <a:schemeClr val="tx1"/>
+          </a:fontRef>
+        </p:style>
+      </p:cxnSp>
       <p:pic>
         <p:nvPicPr>
-          <p:cNvPr id="1066" name="Picture 42" descr="Free Web Icons, 1,000+ Icons in PNG, EPS, SVG format">
-            <a:extLst>
-              <a:ext uri="{FF2B5EF4-FFF2-40B4-BE49-F238E27FC236}">
-                <a16:creationId xmlns:a16="http://schemas.microsoft.com/office/drawing/2014/main" id="{8D92FA00-9723-4A00-BE09-C5959FEFB2E2}"/>
+          <p:cNvPr id="68" name="Picture 2" descr="Antena Parabólica Espelho - Gráfico vetorial grátis no Pixabay">
+            <a:extLst>
+              <a:ext uri="{FF2B5EF4-FFF2-40B4-BE49-F238E27FC236}">
+                <a16:creationId xmlns:a16="http://schemas.microsoft.com/office/drawing/2014/main" id="{7AECE469-6ACC-49EC-955B-8A9374069B1C}"/>
               </a:ext>
             </a:extLst>
           </p:cNvPr>
@@ -4287,7 +4624,7 @@
           <p:nvPr/>
         </p:nvPicPr>
         <p:blipFill>
-          <a:blip r:embed="rId11" cstate="hqprint">
+          <a:blip r:embed="rId13">
             <a:extLst>
               <a:ext uri="{28A0092B-C50C-407E-A947-70E740481C1C}">
                 <a14:useLocalDpi xmlns:a14="http://schemas.microsoft.com/office/drawing/2010/main" val="0"/>
@@ -4301,8 +4638,8 @@
         </p:blipFill>
         <p:spPr bwMode="auto">
           <a:xfrm>
-            <a:off x="7410790" y="6157486"/>
-            <a:ext cx="613228" cy="596999"/>
+            <a:off x="144088" y="2273799"/>
+            <a:ext cx="978949" cy="1182710"/>
           </a:xfrm>
           <a:prstGeom prst="rect">
             <a:avLst/>
@@ -4319,67 +4656,12 @@
           </a:extLst>
         </p:spPr>
       </p:pic>
-      <p:sp>
-        <p:nvSpPr>
-          <p:cNvPr id="30" name="Seta: Dobrada 29">
-            <a:extLst>
-              <a:ext uri="{FF2B5EF4-FFF2-40B4-BE49-F238E27FC236}">
-                <a16:creationId xmlns:a16="http://schemas.microsoft.com/office/drawing/2014/main" id="{3C49814D-B270-495F-941E-4AF3A1133FE0}"/>
-              </a:ext>
-            </a:extLst>
-          </p:cNvPr>
-          <p:cNvSpPr/>
-          <p:nvPr/>
-        </p:nvSpPr>
-        <p:spPr>
-          <a:xfrm>
-            <a:off x="1537252" y="2378599"/>
-            <a:ext cx="4036924" cy="535026"/>
-          </a:xfrm>
-          <a:prstGeom prst="bentArrow">
-            <a:avLst>
-              <a:gd name="adj1" fmla="val 19717"/>
-              <a:gd name="adj2" fmla="val 28063"/>
-              <a:gd name="adj3" fmla="val 47215"/>
-              <a:gd name="adj4" fmla="val 43750"/>
-            </a:avLst>
-          </a:prstGeom>
-        </p:spPr>
-        <p:style>
-          <a:lnRef idx="2">
-            <a:schemeClr val="accent1">
-              <a:shade val="50000"/>
-            </a:schemeClr>
-          </a:lnRef>
-          <a:fillRef idx="1">
-            <a:schemeClr val="accent1"/>
-          </a:fillRef>
-          <a:effectRef idx="0">
-            <a:schemeClr val="accent1"/>
-          </a:effectRef>
-          <a:fontRef idx="minor">
-            <a:schemeClr val="lt1"/>
-          </a:fontRef>
-        </p:style>
-        <p:txBody>
-          <a:bodyPr rtlCol="0" anchor="ctr"/>
-          <a:lstStyle/>
-          <a:p>
-            <a:pPr algn="ctr"/>
-            <a:endParaRPr lang="pt-BR">
-              <a:solidFill>
-                <a:schemeClr val="tx1"/>
-              </a:solidFill>
-            </a:endParaRPr>
-          </a:p>
-        </p:txBody>
-      </p:sp>
       <p:pic>
         <p:nvPicPr>
-          <p:cNvPr id="1068" name="Picture 44" descr="ícone Ligado, globo, internet, rede Livre de WHCompare Isometric ...">
-            <a:extLst>
-              <a:ext uri="{FF2B5EF4-FFF2-40B4-BE49-F238E27FC236}">
-                <a16:creationId xmlns:a16="http://schemas.microsoft.com/office/drawing/2014/main" id="{26EAFCDF-C8D8-41B6-B618-AC0EB91B7BFA}"/>
+          <p:cNvPr id="1028" name="Picture 4" descr="Antena Parabólica Espelho - Gráfico vetorial grátis no Pixabay">
+            <a:extLst>
+              <a:ext uri="{FF2B5EF4-FFF2-40B4-BE49-F238E27FC236}">
+                <a16:creationId xmlns:a16="http://schemas.microsoft.com/office/drawing/2014/main" id="{F7A2D5A1-15D6-479E-BA5E-49961C85CF08}"/>
               </a:ext>
             </a:extLst>
           </p:cNvPr>
@@ -4389,7 +4671,7 @@
           <p:nvPr/>
         </p:nvPicPr>
         <p:blipFill>
-          <a:blip r:embed="rId12" cstate="hqprint">
+          <a:blip r:embed="rId13">
             <a:extLst>
               <a:ext uri="{28A0092B-C50C-407E-A947-70E740481C1C}">
                 <a14:useLocalDpi xmlns:a14="http://schemas.microsoft.com/office/drawing/2010/main" val="0"/>
@@ -4402,9 +4684,9 @@
           </a:stretch>
         </p:blipFill>
         <p:spPr bwMode="auto">
-          <a:xfrm>
-            <a:off x="5655489" y="2119009"/>
-            <a:ext cx="869543" cy="869543"/>
+          <a:xfrm flipH="1">
+            <a:off x="10700909" y="2155884"/>
+            <a:ext cx="988593" cy="1330911"/>
           </a:xfrm>
           <a:prstGeom prst="rect">
             <a:avLst/>
@@ -4421,82 +4703,63 @@
           </a:extLst>
         </p:spPr>
       </p:pic>
-      <p:sp>
-        <p:nvSpPr>
-          <p:cNvPr id="32" name="CaixaDeTexto 31">
-            <a:extLst>
-              <a:ext uri="{FF2B5EF4-FFF2-40B4-BE49-F238E27FC236}">
-                <a16:creationId xmlns:a16="http://schemas.microsoft.com/office/drawing/2014/main" id="{6F157145-322C-4101-B95E-8B9FEDFC2BF6}"/>
-              </a:ext>
-            </a:extLst>
-          </p:cNvPr>
-          <p:cNvSpPr txBox="1"/>
+      <p:cxnSp>
+        <p:nvCxnSpPr>
+          <p:cNvPr id="114" name="Conector de Seta Reta 113">
+            <a:extLst>
+              <a:ext uri="{FF2B5EF4-FFF2-40B4-BE49-F238E27FC236}">
+                <a16:creationId xmlns:a16="http://schemas.microsoft.com/office/drawing/2014/main" id="{31B5D0A8-D579-4AFC-8983-C4EE98DC7A6C}"/>
+              </a:ext>
+            </a:extLst>
+          </p:cNvPr>
+          <p:cNvCxnSpPr>
+            <a:cxnSpLocks/>
+            <a:stCxn id="3" idx="3"/>
+            <a:endCxn id="1072" idx="1"/>
+          </p:cNvCxnSpPr>
           <p:nvPr/>
-        </p:nvSpPr>
+        </p:nvCxnSpPr>
         <p:spPr>
           <a:xfrm>
-            <a:off x="5615730" y="2947127"/>
-            <a:ext cx="1109484" cy="369332"/>
-          </a:xfrm>
-          <a:prstGeom prst="rect">
+            <a:off x="1229070" y="5684980"/>
+            <a:ext cx="2075229" cy="0"/>
+          </a:xfrm>
+          <a:prstGeom prst="straightConnector1">
             <a:avLst/>
           </a:prstGeom>
-          <a:noFill/>
-        </p:spPr>
-        <p:txBody>
-          <a:bodyPr wrap="square" rtlCol="0">
-            <a:spAutoFit/>
-          </a:bodyPr>
-          <a:lstStyle/>
-          <a:p>
-            <a:r>
-              <a:rPr lang="pt-BR" dirty="0"/>
-              <a:t>Internet</a:t>
-            </a:r>
-          </a:p>
-        </p:txBody>
-      </p:sp>
-      <p:sp>
-        <p:nvSpPr>
-          <p:cNvPr id="33" name="CaixaDeTexto 32">
-            <a:extLst>
-              <a:ext uri="{FF2B5EF4-FFF2-40B4-BE49-F238E27FC236}">
-                <a16:creationId xmlns:a16="http://schemas.microsoft.com/office/drawing/2014/main" id="{A56C689D-CDE0-4E65-9411-3D3156A067A8}"/>
-              </a:ext>
-            </a:extLst>
-          </p:cNvPr>
-          <p:cNvSpPr txBox="1"/>
-          <p:nvPr/>
-        </p:nvSpPr>
-        <p:spPr>
-          <a:xfrm>
-            <a:off x="4258794" y="4366102"/>
-            <a:ext cx="992265" cy="654235"/>
-          </a:xfrm>
-          <a:prstGeom prst="rect">
-            <a:avLst/>
-          </a:prstGeom>
-          <a:noFill/>
-        </p:spPr>
-        <p:txBody>
-          <a:bodyPr wrap="square" rtlCol="0">
-            <a:spAutoFit/>
-          </a:bodyPr>
-          <a:lstStyle/>
-          <a:p>
-            <a:r>
-              <a:rPr lang="pt-BR" dirty="0"/>
-              <a:t>Sensor LDR</a:t>
-            </a:r>
-          </a:p>
-        </p:txBody>
-      </p:sp>
+          <a:ln w="49530" cap="flat" cmpd="sng" algn="ctr">
+            <a:solidFill>
+              <a:schemeClr val="bg2">
+                <a:lumMod val="25000"/>
+              </a:schemeClr>
+            </a:solidFill>
+            <a:prstDash val="sysDash"/>
+            <a:round/>
+            <a:headEnd type="arrow" w="med" len="med"/>
+            <a:tailEnd type="arrow" w="med" len="med"/>
+          </a:ln>
+        </p:spPr>
+        <p:style>
+          <a:lnRef idx="0">
+            <a:scrgbClr r="0" g="0" b="0"/>
+          </a:lnRef>
+          <a:fillRef idx="0">
+            <a:scrgbClr r="0" g="0" b="0"/>
+          </a:fillRef>
+          <a:effectRef idx="0">
+            <a:scrgbClr r="0" g="0" b="0"/>
+          </a:effectRef>
+          <a:fontRef idx="minor">
+            <a:schemeClr val="tx1"/>
+          </a:fontRef>
+        </p:style>
+      </p:cxnSp>
       <p:pic>
         <p:nvPicPr>
-          <p:cNvPr id="1072" name="Picture 48" descr="ldr con led | Tinkercad">
-            <a:extLst>
-              <a:ext uri="{FF2B5EF4-FFF2-40B4-BE49-F238E27FC236}">
-                <a16:creationId xmlns:a16="http://schemas.microsoft.com/office/drawing/2014/main" id="{3F72D2D4-0860-4294-8715-8199A75F617F}"/>
+          <p:cNvPr id="115" name="Picture 6" descr="internet-explorer-logo-ie-logo-7 - PNG - Download de Logotipos">
+            <a:extLst>
+              <a:ext uri="{FF2B5EF4-FFF2-40B4-BE49-F238E27FC236}">
+                <a16:creationId xmlns:a16="http://schemas.microsoft.com/office/drawing/2014/main" id="{4367A650-6C56-4EE3-AE20-F2C490A1747B}"/>
               </a:ext>
             </a:extLst>
           </p:cNvPr>
@@ -4505,21 +4768,23 @@
           </p:cNvPicPr>
           <p:nvPr/>
         </p:nvPicPr>
-        <p:blipFill rotWithShape="1">
-          <a:blip r:embed="rId13">
+        <p:blipFill>
+          <a:blip r:embed="rId14">
             <a:extLst>
               <a:ext uri="{28A0092B-C50C-407E-A947-70E740481C1C}">
                 <a14:useLocalDpi xmlns:a14="http://schemas.microsoft.com/office/drawing/2010/main" val="0"/>
               </a:ext>
             </a:extLst>
           </a:blip>
-          <a:srcRect l="24505"/>
-          <a:stretch/>
+          <a:srcRect/>
+          <a:stretch>
+            <a:fillRect/>
+          </a:stretch>
         </p:blipFill>
         <p:spPr bwMode="auto">
           <a:xfrm>
-            <a:off x="3331029" y="4433217"/>
-            <a:ext cx="1991502" cy="2443147"/>
+            <a:off x="7273872" y="6057317"/>
+            <a:ext cx="732473" cy="723761"/>
           </a:xfrm>
           <a:prstGeom prst="rect">
             <a:avLst/>
@@ -4536,209 +4801,6 @@
           </a:extLst>
         </p:spPr>
       </p:pic>
-      <p:sp>
-        <p:nvSpPr>
-          <p:cNvPr id="35" name="Seta: Dobrada 34">
-            <a:extLst>
-              <a:ext uri="{FF2B5EF4-FFF2-40B4-BE49-F238E27FC236}">
-                <a16:creationId xmlns:a16="http://schemas.microsoft.com/office/drawing/2014/main" id="{10007E10-45B4-4DC2-9DB3-00E23AE96402}"/>
-              </a:ext>
-            </a:extLst>
-          </p:cNvPr>
-          <p:cNvSpPr/>
-          <p:nvPr/>
-        </p:nvSpPr>
-        <p:spPr>
-          <a:xfrm rot="5400000">
-            <a:off x="8154699" y="408268"/>
-            <a:ext cx="1880222" cy="3167335"/>
-          </a:xfrm>
-          <a:prstGeom prst="bentArrow">
-            <a:avLst>
-              <a:gd name="adj1" fmla="val 5831"/>
-              <a:gd name="adj2" fmla="val 8645"/>
-              <a:gd name="adj3" fmla="val 14943"/>
-              <a:gd name="adj4" fmla="val 17517"/>
-            </a:avLst>
-          </a:prstGeom>
-        </p:spPr>
-        <p:style>
-          <a:lnRef idx="2">
-            <a:schemeClr val="accent1">
-              <a:shade val="50000"/>
-            </a:schemeClr>
-          </a:lnRef>
-          <a:fillRef idx="1">
-            <a:schemeClr val="accent1"/>
-          </a:fillRef>
-          <a:effectRef idx="0">
-            <a:schemeClr val="accent1"/>
-          </a:effectRef>
-          <a:fontRef idx="minor">
-            <a:schemeClr val="lt1"/>
-          </a:fontRef>
-        </p:style>
-        <p:txBody>
-          <a:bodyPr rtlCol="0" anchor="ctr"/>
-          <a:lstStyle/>
-          <a:p>
-            <a:pPr algn="ctr"/>
-            <a:endParaRPr lang="pt-BR">
-              <a:solidFill>
-                <a:schemeClr val="tx1"/>
-              </a:solidFill>
-            </a:endParaRPr>
-          </a:p>
-        </p:txBody>
-      </p:sp>
-      <p:sp>
-        <p:nvSpPr>
-          <p:cNvPr id="36" name="Seta: para Cima 35">
-            <a:extLst>
-              <a:ext uri="{FF2B5EF4-FFF2-40B4-BE49-F238E27FC236}">
-                <a16:creationId xmlns:a16="http://schemas.microsoft.com/office/drawing/2014/main" id="{CF1D00C0-7AA5-403A-AB51-745F1B8CCBE4}"/>
-              </a:ext>
-            </a:extLst>
-          </p:cNvPr>
-          <p:cNvSpPr/>
-          <p:nvPr/>
-        </p:nvSpPr>
-        <p:spPr>
-          <a:xfrm>
-            <a:off x="5943600" y="1891209"/>
-            <a:ext cx="304800" cy="248044"/>
-          </a:xfrm>
-          <a:prstGeom prst="upArrow">
-            <a:avLst/>
-          </a:prstGeom>
-        </p:spPr>
-        <p:style>
-          <a:lnRef idx="2">
-            <a:schemeClr val="accent1">
-              <a:shade val="50000"/>
-            </a:schemeClr>
-          </a:lnRef>
-          <a:fillRef idx="1">
-            <a:schemeClr val="accent1"/>
-          </a:fillRef>
-          <a:effectRef idx="0">
-            <a:schemeClr val="accent1"/>
-          </a:effectRef>
-          <a:fontRef idx="minor">
-            <a:schemeClr val="lt1"/>
-          </a:fontRef>
-        </p:style>
-        <p:txBody>
-          <a:bodyPr rtlCol="0" anchor="ctr"/>
-          <a:lstStyle/>
-          <a:p>
-            <a:pPr algn="ctr"/>
-            <a:endParaRPr lang="pt-BR" dirty="0"/>
-          </a:p>
-        </p:txBody>
-      </p:sp>
-      <p:pic>
-        <p:nvPicPr>
-          <p:cNvPr id="3" name="Imagem 2" descr="Original file ‎ (SVG file, nominally 100 × 100 pixels ..."/>
-          <p:cNvPicPr>
-            <a:picLocks noChangeAspect="1"/>
-          </p:cNvPicPr>
-          <p:nvPr/>
-        </p:nvPicPr>
-        <p:blipFill>
-          <a:blip r:embed="rId14" cstate="hqprint">
-            <a:extLst>
-              <a:ext uri="{28A0092B-C50C-407E-A947-70E740481C1C}">
-                <a14:useLocalDpi xmlns:a14="http://schemas.microsoft.com/office/drawing/2010/main" val="0"/>
-              </a:ext>
-            </a:extLst>
-          </a:blip>
-          <a:stretch>
-            <a:fillRect/>
-          </a:stretch>
-        </p:blipFill>
-        <p:spPr>
-          <a:xfrm>
-            <a:off x="115909" y="4958833"/>
-            <a:ext cx="1359616" cy="1359616"/>
-          </a:xfrm>
-          <a:prstGeom prst="rect">
-            <a:avLst/>
-          </a:prstGeom>
-        </p:spPr>
-      </p:pic>
-      <p:sp>
-        <p:nvSpPr>
-          <p:cNvPr id="37" name="CaixaDeTexto 36">
-            <a:extLst>
-              <a:ext uri="{FF2B5EF4-FFF2-40B4-BE49-F238E27FC236}">
-                <a16:creationId xmlns:a16="http://schemas.microsoft.com/office/drawing/2014/main" id="{7A50F01C-B5C0-44C5-841A-7817CE3A249C}"/>
-              </a:ext>
-            </a:extLst>
-          </p:cNvPr>
-          <p:cNvSpPr txBox="1"/>
-          <p:nvPr/>
-        </p:nvSpPr>
-        <p:spPr>
-          <a:xfrm>
-            <a:off x="295780" y="6313184"/>
-            <a:ext cx="999874" cy="369332"/>
-          </a:xfrm>
-          <a:prstGeom prst="rect">
-            <a:avLst/>
-          </a:prstGeom>
-          <a:noFill/>
-        </p:spPr>
-        <p:txBody>
-          <a:bodyPr wrap="square" rtlCol="0">
-            <a:spAutoFit/>
-          </a:bodyPr>
-          <a:lstStyle/>
-          <a:p>
-            <a:r>
-              <a:rPr lang="pt-BR" dirty="0" smtClean="0"/>
-              <a:t>LED DIM</a:t>
-            </a:r>
-            <a:endParaRPr lang="pt-BR" dirty="0"/>
-          </a:p>
-        </p:txBody>
-      </p:sp>
-      <p:sp>
-        <p:nvSpPr>
-          <p:cNvPr id="34" name="CaixaDeTexto 33">
-            <a:extLst>
-              <a:ext uri="{FF2B5EF4-FFF2-40B4-BE49-F238E27FC236}">
-                <a16:creationId xmlns:a16="http://schemas.microsoft.com/office/drawing/2014/main" id="{1371B407-FE40-44B5-B500-A4667E8030DB}"/>
-              </a:ext>
-            </a:extLst>
-          </p:cNvPr>
-          <p:cNvSpPr txBox="1"/>
-          <p:nvPr/>
-        </p:nvSpPr>
-        <p:spPr>
-          <a:xfrm>
-            <a:off x="5601043" y="1527068"/>
-            <a:ext cx="1790950" cy="369332"/>
-          </a:xfrm>
-          <a:prstGeom prst="rect">
-            <a:avLst/>
-          </a:prstGeom>
-          <a:noFill/>
-        </p:spPr>
-        <p:txBody>
-          <a:bodyPr wrap="square" rtlCol="0">
-            <a:spAutoFit/>
-          </a:bodyPr>
-          <a:lstStyle/>
-          <a:p>
-            <a:r>
-              <a:rPr lang="pt-BR" dirty="0" smtClean="0"/>
-              <a:t>Servidor</a:t>
-            </a:r>
-            <a:endParaRPr lang="pt-BR" dirty="0"/>
-          </a:p>
-        </p:txBody>
-      </p:sp>
     </p:spTree>
     <p:extLst>
       <p:ext uri="{BB962C8B-B14F-4D97-AF65-F5344CB8AC3E}">
@@ -4749,13 +4811,6 @@
   <p:clrMapOvr>
     <a:masterClrMapping/>
   </p:clrMapOvr>
-  <p:timing>
-    <p:tnLst>
-      <p:par>
-        <p:cTn id="1" dur="indefinite" restart="never" nodeType="tmRoot"/>
-      </p:par>
-    </p:tnLst>
-  </p:timing>
 </p:sld>
 </file>
 

</xml_diff>

<commit_message>
Atualização do LLD para nova versão
</commit_message>
<xml_diff>
--- a/projeto/Documentos/LLD.pptx
+++ b/projeto/Documentos/LLD.pptx
@@ -259,7 +259,7 @@
           <a:p>
             <a:fld id="{9124C99E-1E2C-46C7-9544-CFE55FE760E5}" type="datetimeFigureOut">
               <a:rPr lang="pt-BR" smtClean="0"/>
-              <a:t>07/04/2020</a:t>
+              <a:t>08/04/2020</a:t>
             </a:fld>
             <a:endParaRPr lang="pt-BR"/>
           </a:p>
@@ -457,7 +457,7 @@
           <a:p>
             <a:fld id="{9124C99E-1E2C-46C7-9544-CFE55FE760E5}" type="datetimeFigureOut">
               <a:rPr lang="pt-BR" smtClean="0"/>
-              <a:t>07/04/2020</a:t>
+              <a:t>08/04/2020</a:t>
             </a:fld>
             <a:endParaRPr lang="pt-BR"/>
           </a:p>
@@ -665,7 +665,7 @@
           <a:p>
             <a:fld id="{9124C99E-1E2C-46C7-9544-CFE55FE760E5}" type="datetimeFigureOut">
               <a:rPr lang="pt-BR" smtClean="0"/>
-              <a:t>07/04/2020</a:t>
+              <a:t>08/04/2020</a:t>
             </a:fld>
             <a:endParaRPr lang="pt-BR"/>
           </a:p>
@@ -863,7 +863,7 @@
           <a:p>
             <a:fld id="{9124C99E-1E2C-46C7-9544-CFE55FE760E5}" type="datetimeFigureOut">
               <a:rPr lang="pt-BR" smtClean="0"/>
-              <a:t>07/04/2020</a:t>
+              <a:t>08/04/2020</a:t>
             </a:fld>
             <a:endParaRPr lang="pt-BR"/>
           </a:p>
@@ -1138,7 +1138,7 @@
           <a:p>
             <a:fld id="{9124C99E-1E2C-46C7-9544-CFE55FE760E5}" type="datetimeFigureOut">
               <a:rPr lang="pt-BR" smtClean="0"/>
-              <a:t>07/04/2020</a:t>
+              <a:t>08/04/2020</a:t>
             </a:fld>
             <a:endParaRPr lang="pt-BR"/>
           </a:p>
@@ -1403,7 +1403,7 @@
           <a:p>
             <a:fld id="{9124C99E-1E2C-46C7-9544-CFE55FE760E5}" type="datetimeFigureOut">
               <a:rPr lang="pt-BR" smtClean="0"/>
-              <a:t>07/04/2020</a:t>
+              <a:t>08/04/2020</a:t>
             </a:fld>
             <a:endParaRPr lang="pt-BR"/>
           </a:p>
@@ -1815,7 +1815,7 @@
           <a:p>
             <a:fld id="{9124C99E-1E2C-46C7-9544-CFE55FE760E5}" type="datetimeFigureOut">
               <a:rPr lang="pt-BR" smtClean="0"/>
-              <a:t>07/04/2020</a:t>
+              <a:t>08/04/2020</a:t>
             </a:fld>
             <a:endParaRPr lang="pt-BR"/>
           </a:p>
@@ -1956,7 +1956,7 @@
           <a:p>
             <a:fld id="{9124C99E-1E2C-46C7-9544-CFE55FE760E5}" type="datetimeFigureOut">
               <a:rPr lang="pt-BR" smtClean="0"/>
-              <a:t>07/04/2020</a:t>
+              <a:t>08/04/2020</a:t>
             </a:fld>
             <a:endParaRPr lang="pt-BR"/>
           </a:p>
@@ -2069,7 +2069,7 @@
           <a:p>
             <a:fld id="{9124C99E-1E2C-46C7-9544-CFE55FE760E5}" type="datetimeFigureOut">
               <a:rPr lang="pt-BR" smtClean="0"/>
-              <a:t>07/04/2020</a:t>
+              <a:t>08/04/2020</a:t>
             </a:fld>
             <a:endParaRPr lang="pt-BR"/>
           </a:p>
@@ -2380,7 +2380,7 @@
           <a:p>
             <a:fld id="{9124C99E-1E2C-46C7-9544-CFE55FE760E5}" type="datetimeFigureOut">
               <a:rPr lang="pt-BR" smtClean="0"/>
-              <a:t>07/04/2020</a:t>
+              <a:t>08/04/2020</a:t>
             </a:fld>
             <a:endParaRPr lang="pt-BR"/>
           </a:p>
@@ -2668,7 +2668,7 @@
           <a:p>
             <a:fld id="{9124C99E-1E2C-46C7-9544-CFE55FE760E5}" type="datetimeFigureOut">
               <a:rPr lang="pt-BR" smtClean="0"/>
-              <a:t>07/04/2020</a:t>
+              <a:t>08/04/2020</a:t>
             </a:fld>
             <a:endParaRPr lang="pt-BR"/>
           </a:p>
@@ -2909,7 +2909,7 @@
           <a:p>
             <a:fld id="{9124C99E-1E2C-46C7-9544-CFE55FE760E5}" type="datetimeFigureOut">
               <a:rPr lang="pt-BR" smtClean="0"/>
-              <a:t>07/04/2020</a:t>
+              <a:t>08/04/2020</a:t>
             </a:fld>
             <a:endParaRPr lang="pt-BR"/>
           </a:p>
@@ -4037,8 +4037,8 @@
         </p:nvSpPr>
         <p:spPr>
           <a:xfrm>
-            <a:off x="10381882" y="5919804"/>
-            <a:ext cx="1626649" cy="923330"/>
+            <a:off x="10219335" y="5911358"/>
+            <a:ext cx="1626649" cy="646331"/>
           </a:xfrm>
           <a:prstGeom prst="rect">
             <a:avLst/>
@@ -4053,13 +4053,7 @@
           <a:p>
             <a:r>
               <a:rPr lang="pt-BR" dirty="0"/>
-              <a:t>Navegador onde site está</a:t>
-            </a:r>
-          </a:p>
-          <a:p>
-            <a:r>
-              <a:rPr lang="pt-BR" dirty="0"/>
-              <a:t>hospedado</a:t>
+              <a:t>Navegador do usuário</a:t>
             </a:r>
           </a:p>
         </p:txBody>
@@ -4801,6 +4795,82 @@
           </a:extLst>
         </p:spPr>
       </p:pic>
+      <p:sp>
+        <p:nvSpPr>
+          <p:cNvPr id="2" name="CaixaDeTexto 1">
+            <a:extLst>
+              <a:ext uri="{FF2B5EF4-FFF2-40B4-BE49-F238E27FC236}">
+                <a16:creationId xmlns:a16="http://schemas.microsoft.com/office/drawing/2014/main" id="{3F77099C-8ED9-41E6-9B3F-49124A0BB572}"/>
+              </a:ext>
+            </a:extLst>
+          </p:cNvPr>
+          <p:cNvSpPr txBox="1"/>
+          <p:nvPr/>
+        </p:nvSpPr>
+        <p:spPr>
+          <a:xfrm>
+            <a:off x="8081925" y="3054046"/>
+            <a:ext cx="2049803" cy="338554"/>
+          </a:xfrm>
+          <a:prstGeom prst="rect">
+            <a:avLst/>
+          </a:prstGeom>
+          <a:noFill/>
+        </p:spPr>
+        <p:txBody>
+          <a:bodyPr wrap="square" rtlCol="0">
+            <a:spAutoFit/>
+          </a:bodyPr>
+          <a:lstStyle/>
+          <a:p>
+            <a:r>
+              <a:rPr lang="pt-BR" sz="1600" b="1" dirty="0">
+                <a:latin typeface="Arial" panose="020B0604020202020204" pitchFamily="34" charset="0"/>
+                <a:cs typeface="Arial" panose="020B0604020202020204" pitchFamily="34" charset="0"/>
+              </a:rPr>
+              <a:t>Parte do usuário</a:t>
+            </a:r>
+          </a:p>
+        </p:txBody>
+      </p:sp>
+      <p:sp>
+        <p:nvSpPr>
+          <p:cNvPr id="4" name="CaixaDeTexto 3">
+            <a:extLst>
+              <a:ext uri="{FF2B5EF4-FFF2-40B4-BE49-F238E27FC236}">
+                <a16:creationId xmlns:a16="http://schemas.microsoft.com/office/drawing/2014/main" id="{7C09AAF9-05E5-49A0-8F57-809F72A0FC81}"/>
+              </a:ext>
+            </a:extLst>
+          </p:cNvPr>
+          <p:cNvSpPr txBox="1"/>
+          <p:nvPr/>
+        </p:nvSpPr>
+        <p:spPr>
+          <a:xfrm>
+            <a:off x="2026314" y="3072357"/>
+            <a:ext cx="2097271" cy="338554"/>
+          </a:xfrm>
+          <a:prstGeom prst="rect">
+            <a:avLst/>
+          </a:prstGeom>
+          <a:noFill/>
+        </p:spPr>
+        <p:txBody>
+          <a:bodyPr wrap="square" rtlCol="0">
+            <a:spAutoFit/>
+          </a:bodyPr>
+          <a:lstStyle/>
+          <a:p>
+            <a:r>
+              <a:rPr lang="pt-BR" sz="1600" b="1" dirty="0">
+                <a:latin typeface="Arial" panose="020B0604020202020204" pitchFamily="34" charset="0"/>
+                <a:cs typeface="Arial" panose="020B0604020202020204" pitchFamily="34" charset="0"/>
+              </a:rPr>
+              <a:t>Parte da solução</a:t>
+            </a:r>
+          </a:p>
+        </p:txBody>
+      </p:sp>
     </p:spTree>
     <p:extLst>
       <p:ext uri="{BB962C8B-B14F-4D97-AF65-F5344CB8AC3E}">

</xml_diff>